<commit_message>
Update GUI :paintbrush: | Add ProgramWindow :desktop_computer:
</commit_message>
<xml_diff>
--- a/others/Background - Proyecto 2 S.O.pptx
+++ b/others/Background - Proyecto 2 S.O.pptx
@@ -16,8 +16,11 @@
     <p:sldId id="269" r:id="rId10"/>
     <p:sldId id="271" r:id="rId11"/>
     <p:sldId id="273" r:id="rId12"/>
-    <p:sldId id="274" r:id="rId13"/>
-    <p:sldId id="275" r:id="rId14"/>
+    <p:sldId id="276" r:id="rId13"/>
+    <p:sldId id="277" r:id="rId14"/>
+    <p:sldId id="274" r:id="rId15"/>
+    <p:sldId id="275" r:id="rId16"/>
+    <p:sldId id="279" r:id="rId17"/>
   </p:sldIdLst>
   <p:sldSz cx="12192000" cy="6858000"/>
   <p:notesSz cx="6858000" cy="9144000"/>
@@ -273,7 +276,7 @@
           <a:p>
             <a:fld id="{E4357CC5-A7E9-4741-9CFB-1DE0539F89CE}" type="datetimeFigureOut">
               <a:rPr lang="es-419" smtClean="0"/>
-              <a:t>23/3/2019</a:t>
+              <a:t>25/3/2019</a:t>
             </a:fld>
             <a:endParaRPr lang="es-419"/>
           </a:p>
@@ -473,7 +476,7 @@
           <a:p>
             <a:fld id="{E4357CC5-A7E9-4741-9CFB-1DE0539F89CE}" type="datetimeFigureOut">
               <a:rPr lang="es-419" smtClean="0"/>
-              <a:t>23/3/2019</a:t>
+              <a:t>25/3/2019</a:t>
             </a:fld>
             <a:endParaRPr lang="es-419"/>
           </a:p>
@@ -683,7 +686,7 @@
           <a:p>
             <a:fld id="{E4357CC5-A7E9-4741-9CFB-1DE0539F89CE}" type="datetimeFigureOut">
               <a:rPr lang="es-419" smtClean="0"/>
-              <a:t>23/3/2019</a:t>
+              <a:t>25/3/2019</a:t>
             </a:fld>
             <a:endParaRPr lang="es-419"/>
           </a:p>
@@ -883,7 +886,7 @@
           <a:p>
             <a:fld id="{E4357CC5-A7E9-4741-9CFB-1DE0539F89CE}" type="datetimeFigureOut">
               <a:rPr lang="es-419" smtClean="0"/>
-              <a:t>23/3/2019</a:t>
+              <a:t>25/3/2019</a:t>
             </a:fld>
             <a:endParaRPr lang="es-419"/>
           </a:p>
@@ -1159,7 +1162,7 @@
           <a:p>
             <a:fld id="{E4357CC5-A7E9-4741-9CFB-1DE0539F89CE}" type="datetimeFigureOut">
               <a:rPr lang="es-419" smtClean="0"/>
-              <a:t>23/3/2019</a:t>
+              <a:t>25/3/2019</a:t>
             </a:fld>
             <a:endParaRPr lang="es-419"/>
           </a:p>
@@ -1427,7 +1430,7 @@
           <a:p>
             <a:fld id="{E4357CC5-A7E9-4741-9CFB-1DE0539F89CE}" type="datetimeFigureOut">
               <a:rPr lang="es-419" smtClean="0"/>
-              <a:t>23/3/2019</a:t>
+              <a:t>25/3/2019</a:t>
             </a:fld>
             <a:endParaRPr lang="es-419"/>
           </a:p>
@@ -1842,7 +1845,7 @@
           <a:p>
             <a:fld id="{E4357CC5-A7E9-4741-9CFB-1DE0539F89CE}" type="datetimeFigureOut">
               <a:rPr lang="es-419" smtClean="0"/>
-              <a:t>23/3/2019</a:t>
+              <a:t>25/3/2019</a:t>
             </a:fld>
             <a:endParaRPr lang="es-419"/>
           </a:p>
@@ -1984,7 +1987,7 @@
           <a:p>
             <a:fld id="{E4357CC5-A7E9-4741-9CFB-1DE0539F89CE}" type="datetimeFigureOut">
               <a:rPr lang="es-419" smtClean="0"/>
-              <a:t>23/3/2019</a:t>
+              <a:t>25/3/2019</a:t>
             </a:fld>
             <a:endParaRPr lang="es-419"/>
           </a:p>
@@ -2097,7 +2100,7 @@
           <a:p>
             <a:fld id="{E4357CC5-A7E9-4741-9CFB-1DE0539F89CE}" type="datetimeFigureOut">
               <a:rPr lang="es-419" smtClean="0"/>
-              <a:t>23/3/2019</a:t>
+              <a:t>25/3/2019</a:t>
             </a:fld>
             <a:endParaRPr lang="es-419"/>
           </a:p>
@@ -2410,7 +2413,7 @@
           <a:p>
             <a:fld id="{E4357CC5-A7E9-4741-9CFB-1DE0539F89CE}" type="datetimeFigureOut">
               <a:rPr lang="es-419" smtClean="0"/>
-              <a:t>23/3/2019</a:t>
+              <a:t>25/3/2019</a:t>
             </a:fld>
             <a:endParaRPr lang="es-419"/>
           </a:p>
@@ -2699,7 +2702,7 @@
           <a:p>
             <a:fld id="{E4357CC5-A7E9-4741-9CFB-1DE0539F89CE}" type="datetimeFigureOut">
               <a:rPr lang="es-419" smtClean="0"/>
-              <a:t>23/3/2019</a:t>
+              <a:t>25/3/2019</a:t>
             </a:fld>
             <a:endParaRPr lang="es-419"/>
           </a:p>
@@ -2942,7 +2945,7 @@
           <a:p>
             <a:fld id="{E4357CC5-A7E9-4741-9CFB-1DE0539F89CE}" type="datetimeFigureOut">
               <a:rPr lang="es-419" smtClean="0"/>
-              <a:t>23/3/2019</a:t>
+              <a:t>25/3/2019</a:t>
             </a:fld>
             <a:endParaRPr lang="es-419"/>
           </a:p>
@@ -11104,6 +11107,2478 @@
           <a:chExt cx="0" cy="0"/>
         </a:xfrm>
       </p:grpSpPr>
+      <p:pic>
+        <p:nvPicPr>
+          <p:cNvPr id="5" name="Imagen 4">
+            <a:extLst>
+              <a:ext uri="{FF2B5EF4-FFF2-40B4-BE49-F238E27FC236}">
+                <a16:creationId xmlns:a16="http://schemas.microsoft.com/office/drawing/2014/main" id="{32F22644-81F6-4721-9AE4-51158DE44E64}"/>
+              </a:ext>
+            </a:extLst>
+          </p:cNvPr>
+          <p:cNvPicPr>
+            <a:picLocks noChangeAspect="1"/>
+          </p:cNvPicPr>
+          <p:nvPr/>
+        </p:nvPicPr>
+        <p:blipFill>
+          <a:blip r:embed="rId2">
+            <a:extLst>
+              <a:ext uri="{28A0092B-C50C-407E-A947-70E740481C1C}">
+                <a14:useLocalDpi xmlns:a14="http://schemas.microsoft.com/office/drawing/2010/main" val="0"/>
+              </a:ext>
+            </a:extLst>
+          </a:blip>
+          <a:stretch>
+            <a:fillRect/>
+          </a:stretch>
+        </p:blipFill>
+        <p:spPr>
+          <a:xfrm>
+            <a:off x="609123" y="728238"/>
+            <a:ext cx="10769926" cy="5401524"/>
+          </a:xfrm>
+          <a:prstGeom prst="rect">
+            <a:avLst/>
+          </a:prstGeom>
+        </p:spPr>
+      </p:pic>
+      <p:sp>
+        <p:nvSpPr>
+          <p:cNvPr id="7" name="Rectángulo 6">
+            <a:extLst>
+              <a:ext uri="{FF2B5EF4-FFF2-40B4-BE49-F238E27FC236}">
+                <a16:creationId xmlns:a16="http://schemas.microsoft.com/office/drawing/2014/main" id="{BEFB36E5-199E-415E-8EDD-8718DBA4B11F}"/>
+              </a:ext>
+            </a:extLst>
+          </p:cNvPr>
+          <p:cNvSpPr/>
+          <p:nvPr/>
+        </p:nvSpPr>
+        <p:spPr>
+          <a:xfrm>
+            <a:off x="609122" y="728238"/>
+            <a:ext cx="10769926" cy="4138402"/>
+          </a:xfrm>
+          <a:prstGeom prst="rect">
+            <a:avLst/>
+          </a:prstGeom>
+          <a:solidFill>
+            <a:srgbClr val="4FB5C1"/>
+          </a:solidFill>
+          <a:ln>
+            <a:noFill/>
+          </a:ln>
+        </p:spPr>
+        <p:style>
+          <a:lnRef idx="2">
+            <a:schemeClr val="accent1">
+              <a:shade val="50000"/>
+            </a:schemeClr>
+          </a:lnRef>
+          <a:fillRef idx="1">
+            <a:schemeClr val="accent1"/>
+          </a:fillRef>
+          <a:effectRef idx="0">
+            <a:schemeClr val="accent1"/>
+          </a:effectRef>
+          <a:fontRef idx="minor">
+            <a:schemeClr val="lt1"/>
+          </a:fontRef>
+        </p:style>
+        <p:txBody>
+          <a:bodyPr rtlCol="0" anchor="ctr"/>
+          <a:lstStyle/>
+          <a:p>
+            <a:pPr algn="ctr"/>
+            <a:endParaRPr lang="es-419"/>
+          </a:p>
+        </p:txBody>
+      </p:sp>
+      <p:sp>
+        <p:nvSpPr>
+          <p:cNvPr id="3" name="Rectángulo 2">
+            <a:extLst>
+              <a:ext uri="{FF2B5EF4-FFF2-40B4-BE49-F238E27FC236}">
+                <a16:creationId xmlns:a16="http://schemas.microsoft.com/office/drawing/2014/main" id="{3A238BA1-AED0-4561-AD72-37AACDD92426}"/>
+              </a:ext>
+            </a:extLst>
+          </p:cNvPr>
+          <p:cNvSpPr/>
+          <p:nvPr/>
+        </p:nvSpPr>
+        <p:spPr>
+          <a:xfrm>
+            <a:off x="609123" y="4654420"/>
+            <a:ext cx="10769926" cy="476614"/>
+          </a:xfrm>
+          <a:prstGeom prst="rect">
+            <a:avLst/>
+          </a:prstGeom>
+          <a:solidFill>
+            <a:srgbClr val="33949A"/>
+          </a:solidFill>
+          <a:ln>
+            <a:noFill/>
+          </a:ln>
+        </p:spPr>
+        <p:style>
+          <a:lnRef idx="2">
+            <a:schemeClr val="accent1">
+              <a:shade val="50000"/>
+            </a:schemeClr>
+          </a:lnRef>
+          <a:fillRef idx="1">
+            <a:schemeClr val="accent1"/>
+          </a:fillRef>
+          <a:effectRef idx="0">
+            <a:schemeClr val="accent1"/>
+          </a:effectRef>
+          <a:fontRef idx="minor">
+            <a:schemeClr val="lt1"/>
+          </a:fontRef>
+        </p:style>
+        <p:txBody>
+          <a:bodyPr rtlCol="0" anchor="ctr"/>
+          <a:lstStyle/>
+          <a:p>
+            <a:pPr algn="ctr"/>
+            <a:endParaRPr lang="es-419"/>
+          </a:p>
+        </p:txBody>
+      </p:sp>
+      <p:sp>
+        <p:nvSpPr>
+          <p:cNvPr id="20" name="Arco 19">
+            <a:extLst>
+              <a:ext uri="{FF2B5EF4-FFF2-40B4-BE49-F238E27FC236}">
+                <a16:creationId xmlns:a16="http://schemas.microsoft.com/office/drawing/2014/main" id="{D1A19CB0-3F23-4000-85F1-F7EFE5B5D3B0}"/>
+              </a:ext>
+            </a:extLst>
+          </p:cNvPr>
+          <p:cNvSpPr/>
+          <p:nvPr/>
+        </p:nvSpPr>
+        <p:spPr>
+          <a:xfrm>
+            <a:off x="4581652" y="4943807"/>
+            <a:ext cx="3028696" cy="476614"/>
+          </a:xfrm>
+          <a:prstGeom prst="arc">
+            <a:avLst>
+              <a:gd name="adj1" fmla="val 10991487"/>
+              <a:gd name="adj2" fmla="val 21405921"/>
+            </a:avLst>
+          </a:prstGeom>
+          <a:ln w="69850">
+            <a:solidFill>
+              <a:schemeClr val="bg1">
+                <a:lumMod val="75000"/>
+              </a:schemeClr>
+            </a:solidFill>
+          </a:ln>
+        </p:spPr>
+        <p:style>
+          <a:lnRef idx="1">
+            <a:schemeClr val="accent1"/>
+          </a:lnRef>
+          <a:fillRef idx="0">
+            <a:schemeClr val="accent1"/>
+          </a:fillRef>
+          <a:effectRef idx="0">
+            <a:schemeClr val="accent1"/>
+          </a:effectRef>
+          <a:fontRef idx="minor">
+            <a:schemeClr val="tx1"/>
+          </a:fontRef>
+        </p:style>
+        <p:txBody>
+          <a:bodyPr rtlCol="0" anchor="ctr"/>
+          <a:lstStyle/>
+          <a:p>
+            <a:pPr algn="ctr"/>
+            <a:endParaRPr lang="es-419"/>
+          </a:p>
+        </p:txBody>
+      </p:sp>
+      <p:sp>
+        <p:nvSpPr>
+          <p:cNvPr id="26" name="Arco 25">
+            <a:extLst>
+              <a:ext uri="{FF2B5EF4-FFF2-40B4-BE49-F238E27FC236}">
+                <a16:creationId xmlns:a16="http://schemas.microsoft.com/office/drawing/2014/main" id="{54EA3C4F-1A97-417E-A70D-9A94CFF28D54}"/>
+              </a:ext>
+            </a:extLst>
+          </p:cNvPr>
+          <p:cNvSpPr/>
+          <p:nvPr/>
+        </p:nvSpPr>
+        <p:spPr>
+          <a:xfrm>
+            <a:off x="4581652" y="4998349"/>
+            <a:ext cx="3028696" cy="476614"/>
+          </a:xfrm>
+          <a:prstGeom prst="arc">
+            <a:avLst>
+              <a:gd name="adj1" fmla="val 10991487"/>
+              <a:gd name="adj2" fmla="val 21405921"/>
+            </a:avLst>
+          </a:prstGeom>
+          <a:ln w="34925">
+            <a:solidFill>
+              <a:srgbClr val="33949A"/>
+            </a:solidFill>
+          </a:ln>
+        </p:spPr>
+        <p:style>
+          <a:lnRef idx="1">
+            <a:schemeClr val="accent1"/>
+          </a:lnRef>
+          <a:fillRef idx="0">
+            <a:schemeClr val="accent1"/>
+          </a:fillRef>
+          <a:effectRef idx="0">
+            <a:schemeClr val="accent1"/>
+          </a:effectRef>
+          <a:fontRef idx="minor">
+            <a:schemeClr val="tx1"/>
+          </a:fontRef>
+        </p:style>
+        <p:txBody>
+          <a:bodyPr rtlCol="0" anchor="ctr"/>
+          <a:lstStyle/>
+          <a:p>
+            <a:pPr algn="ctr"/>
+            <a:endParaRPr lang="es-419"/>
+          </a:p>
+        </p:txBody>
+      </p:sp>
+      <p:grpSp>
+        <p:nvGrpSpPr>
+          <p:cNvPr id="41" name="Grupo 40">
+            <a:extLst>
+              <a:ext uri="{FF2B5EF4-FFF2-40B4-BE49-F238E27FC236}">
+                <a16:creationId xmlns:a16="http://schemas.microsoft.com/office/drawing/2014/main" id="{1A3DE6CD-84A5-4D9B-B3DF-C797471F4BBC}"/>
+              </a:ext>
+            </a:extLst>
+          </p:cNvPr>
+          <p:cNvGrpSpPr/>
+          <p:nvPr/>
+        </p:nvGrpSpPr>
+        <p:grpSpPr>
+          <a:xfrm>
+            <a:off x="4509021" y="4404484"/>
+            <a:ext cx="3171770" cy="904805"/>
+            <a:chOff x="4509021" y="4404484"/>
+            <a:chExt cx="3171770" cy="904805"/>
+          </a:xfrm>
+        </p:grpSpPr>
+        <p:sp>
+          <p:nvSpPr>
+            <p:cNvPr id="19" name="Arco 18">
+              <a:extLst>
+                <a:ext uri="{FF2B5EF4-FFF2-40B4-BE49-F238E27FC236}">
+                  <a16:creationId xmlns:a16="http://schemas.microsoft.com/office/drawing/2014/main" id="{482AFB60-136B-49FC-8FEF-BD549D368C8A}"/>
+                </a:ext>
+              </a:extLst>
+            </p:cNvPr>
+            <p:cNvSpPr/>
+            <p:nvPr/>
+          </p:nvSpPr>
+          <p:spPr>
+            <a:xfrm>
+              <a:off x="4585462" y="4832675"/>
+              <a:ext cx="3028696" cy="476614"/>
+            </a:xfrm>
+            <a:prstGeom prst="arc">
+              <a:avLst>
+                <a:gd name="adj1" fmla="val 10932239"/>
+                <a:gd name="adj2" fmla="val 21423255"/>
+              </a:avLst>
+            </a:prstGeom>
+            <a:ln w="174625">
+              <a:solidFill>
+                <a:srgbClr val="929DAC"/>
+              </a:solidFill>
+            </a:ln>
+          </p:spPr>
+          <p:style>
+            <a:lnRef idx="1">
+              <a:schemeClr val="accent1"/>
+            </a:lnRef>
+            <a:fillRef idx="0">
+              <a:schemeClr val="accent1"/>
+            </a:fillRef>
+            <a:effectRef idx="0">
+              <a:schemeClr val="accent1"/>
+            </a:effectRef>
+            <a:fontRef idx="minor">
+              <a:schemeClr val="tx1"/>
+            </a:fontRef>
+          </p:style>
+          <p:txBody>
+            <a:bodyPr rtlCol="0" anchor="ctr"/>
+            <a:lstStyle/>
+            <a:p>
+              <a:pPr algn="ctr"/>
+              <a:endParaRPr lang="es-419"/>
+            </a:p>
+          </p:txBody>
+        </p:sp>
+        <p:sp>
+          <p:nvSpPr>
+            <p:cNvPr id="23" name="Rectángulo 22">
+              <a:extLst>
+                <a:ext uri="{FF2B5EF4-FFF2-40B4-BE49-F238E27FC236}">
+                  <a16:creationId xmlns:a16="http://schemas.microsoft.com/office/drawing/2014/main" id="{E8251545-1379-46F9-8BAB-ACBC0D411F54}"/>
+                </a:ext>
+              </a:extLst>
+            </p:cNvPr>
+            <p:cNvSpPr/>
+            <p:nvPr/>
+          </p:nvSpPr>
+          <p:spPr>
+            <a:xfrm rot="2030111" flipV="1">
+              <a:off x="4566667" y="4991708"/>
+              <a:ext cx="244643" cy="45719"/>
+            </a:xfrm>
+            <a:prstGeom prst="rect">
+              <a:avLst/>
+            </a:prstGeom>
+            <a:solidFill>
+              <a:srgbClr val="BFBFBF"/>
+            </a:solidFill>
+            <a:ln>
+              <a:noFill/>
+            </a:ln>
+          </p:spPr>
+          <p:style>
+            <a:lnRef idx="2">
+              <a:schemeClr val="accent1">
+                <a:shade val="50000"/>
+              </a:schemeClr>
+            </a:lnRef>
+            <a:fillRef idx="1">
+              <a:schemeClr val="accent1"/>
+            </a:fillRef>
+            <a:effectRef idx="0">
+              <a:schemeClr val="accent1"/>
+            </a:effectRef>
+            <a:fontRef idx="minor">
+              <a:schemeClr val="lt1"/>
+            </a:fontRef>
+          </p:style>
+          <p:txBody>
+            <a:bodyPr rtlCol="0" anchor="ctr"/>
+            <a:lstStyle/>
+            <a:p>
+              <a:pPr algn="ctr"/>
+              <a:endParaRPr lang="es-419"/>
+            </a:p>
+          </p:txBody>
+        </p:sp>
+        <p:sp>
+          <p:nvSpPr>
+            <p:cNvPr id="24" name="Rectángulo 23">
+              <a:extLst>
+                <a:ext uri="{FF2B5EF4-FFF2-40B4-BE49-F238E27FC236}">
+                  <a16:creationId xmlns:a16="http://schemas.microsoft.com/office/drawing/2014/main" id="{82A0B092-6BF2-4F1C-B38B-B1554174E0D0}"/>
+                </a:ext>
+              </a:extLst>
+            </p:cNvPr>
+            <p:cNvSpPr/>
+            <p:nvPr/>
+          </p:nvSpPr>
+          <p:spPr>
+            <a:xfrm rot="2030111" flipV="1">
+              <a:off x="4509021" y="5018873"/>
+              <a:ext cx="269528" cy="88850"/>
+            </a:xfrm>
+            <a:prstGeom prst="rect">
+              <a:avLst/>
+            </a:prstGeom>
+            <a:solidFill>
+              <a:srgbClr val="33949A"/>
+            </a:solidFill>
+            <a:ln>
+              <a:noFill/>
+            </a:ln>
+          </p:spPr>
+          <p:style>
+            <a:lnRef idx="2">
+              <a:schemeClr val="accent1">
+                <a:shade val="50000"/>
+              </a:schemeClr>
+            </a:lnRef>
+            <a:fillRef idx="1">
+              <a:schemeClr val="accent1"/>
+            </a:fillRef>
+            <a:effectRef idx="0">
+              <a:schemeClr val="accent1"/>
+            </a:effectRef>
+            <a:fontRef idx="minor">
+              <a:schemeClr val="lt1"/>
+            </a:fontRef>
+          </p:style>
+          <p:txBody>
+            <a:bodyPr rtlCol="0" anchor="ctr"/>
+            <a:lstStyle/>
+            <a:p>
+              <a:pPr algn="ctr"/>
+              <a:endParaRPr lang="es-419"/>
+            </a:p>
+          </p:txBody>
+        </p:sp>
+        <p:sp>
+          <p:nvSpPr>
+            <p:cNvPr id="25" name="Rectángulo 24">
+              <a:extLst>
+                <a:ext uri="{FF2B5EF4-FFF2-40B4-BE49-F238E27FC236}">
+                  <a16:creationId xmlns:a16="http://schemas.microsoft.com/office/drawing/2014/main" id="{DD127A63-D435-45F0-B47A-0C4502C3406E}"/>
+                </a:ext>
+              </a:extLst>
+            </p:cNvPr>
+            <p:cNvSpPr/>
+            <p:nvPr/>
+          </p:nvSpPr>
+          <p:spPr>
+            <a:xfrm rot="5400000" flipV="1">
+              <a:off x="4502957" y="4909775"/>
+              <a:ext cx="157388" cy="45719"/>
+            </a:xfrm>
+            <a:prstGeom prst="rect">
+              <a:avLst/>
+            </a:prstGeom>
+            <a:solidFill>
+              <a:srgbClr val="33949A"/>
+            </a:solidFill>
+            <a:ln>
+              <a:noFill/>
+            </a:ln>
+          </p:spPr>
+          <p:style>
+            <a:lnRef idx="2">
+              <a:schemeClr val="accent1">
+                <a:shade val="50000"/>
+              </a:schemeClr>
+            </a:lnRef>
+            <a:fillRef idx="1">
+              <a:schemeClr val="accent1"/>
+            </a:fillRef>
+            <a:effectRef idx="0">
+              <a:schemeClr val="accent1"/>
+            </a:effectRef>
+            <a:fontRef idx="minor">
+              <a:schemeClr val="lt1"/>
+            </a:fontRef>
+          </p:style>
+          <p:txBody>
+            <a:bodyPr rtlCol="0" anchor="ctr"/>
+            <a:lstStyle/>
+            <a:p>
+              <a:pPr algn="ctr"/>
+              <a:endParaRPr lang="es-419"/>
+            </a:p>
+          </p:txBody>
+        </p:sp>
+        <p:grpSp>
+          <p:nvGrpSpPr>
+            <p:cNvPr id="31" name="Grupo 30">
+              <a:extLst>
+                <a:ext uri="{FF2B5EF4-FFF2-40B4-BE49-F238E27FC236}">
+                  <a16:creationId xmlns:a16="http://schemas.microsoft.com/office/drawing/2014/main" id="{1BC1194E-980B-4CD2-AEA3-5B0229EC76E2}"/>
+                </a:ext>
+              </a:extLst>
+            </p:cNvPr>
+            <p:cNvGrpSpPr/>
+            <p:nvPr/>
+          </p:nvGrpSpPr>
+          <p:grpSpPr>
+            <a:xfrm flipH="1">
+              <a:off x="7351180" y="4846820"/>
+              <a:ext cx="329611" cy="270509"/>
+              <a:chOff x="6679582" y="3590881"/>
+              <a:chExt cx="329611" cy="270509"/>
+            </a:xfrm>
+          </p:grpSpPr>
+          <p:sp>
+            <p:nvSpPr>
+              <p:cNvPr id="28" name="Rectángulo 27">
+                <a:extLst>
+                  <a:ext uri="{FF2B5EF4-FFF2-40B4-BE49-F238E27FC236}">
+                    <a16:creationId xmlns:a16="http://schemas.microsoft.com/office/drawing/2014/main" id="{09A95ED3-3D41-4764-AC12-3F60433BBBD2}"/>
+                  </a:ext>
+                </a:extLst>
+              </p:cNvPr>
+              <p:cNvSpPr/>
+              <p:nvPr/>
+            </p:nvSpPr>
+            <p:spPr>
+              <a:xfrm rot="2030111" flipV="1">
+                <a:off x="6742316" y="3728648"/>
+                <a:ext cx="244643" cy="45719"/>
+              </a:xfrm>
+              <a:prstGeom prst="rect">
+                <a:avLst/>
+              </a:prstGeom>
+              <a:solidFill>
+                <a:srgbClr val="BFBFBF"/>
+              </a:solidFill>
+              <a:ln>
+                <a:noFill/>
+              </a:ln>
+            </p:spPr>
+            <p:style>
+              <a:lnRef idx="2">
+                <a:schemeClr val="accent1">
+                  <a:shade val="50000"/>
+                </a:schemeClr>
+              </a:lnRef>
+              <a:fillRef idx="1">
+                <a:schemeClr val="accent1"/>
+              </a:fillRef>
+              <a:effectRef idx="0">
+                <a:schemeClr val="accent1"/>
+              </a:effectRef>
+              <a:fontRef idx="minor">
+                <a:schemeClr val="lt1"/>
+              </a:fontRef>
+            </p:style>
+            <p:txBody>
+              <a:bodyPr rtlCol="0" anchor="ctr"/>
+              <a:lstStyle/>
+              <a:p>
+                <a:pPr algn="ctr"/>
+                <a:endParaRPr lang="es-419"/>
+              </a:p>
+            </p:txBody>
+          </p:sp>
+          <p:sp>
+            <p:nvSpPr>
+              <p:cNvPr id="29" name="Rectángulo 28">
+                <a:extLst>
+                  <a:ext uri="{FF2B5EF4-FFF2-40B4-BE49-F238E27FC236}">
+                    <a16:creationId xmlns:a16="http://schemas.microsoft.com/office/drawing/2014/main" id="{2948FC20-3302-40D2-973F-0F39933D52CB}"/>
+                  </a:ext>
+                </a:extLst>
+              </p:cNvPr>
+              <p:cNvSpPr/>
+              <p:nvPr/>
+            </p:nvSpPr>
+            <p:spPr>
+              <a:xfrm rot="2030111" flipV="1">
+                <a:off x="6679582" y="3772540"/>
+                <a:ext cx="329611" cy="88850"/>
+              </a:xfrm>
+              <a:prstGeom prst="rect">
+                <a:avLst/>
+              </a:prstGeom>
+              <a:solidFill>
+                <a:srgbClr val="33949A"/>
+              </a:solidFill>
+              <a:ln>
+                <a:noFill/>
+              </a:ln>
+            </p:spPr>
+            <p:style>
+              <a:lnRef idx="2">
+                <a:schemeClr val="accent1">
+                  <a:shade val="50000"/>
+                </a:schemeClr>
+              </a:lnRef>
+              <a:fillRef idx="1">
+                <a:schemeClr val="accent1"/>
+              </a:fillRef>
+              <a:effectRef idx="0">
+                <a:schemeClr val="accent1"/>
+              </a:effectRef>
+              <a:fontRef idx="minor">
+                <a:schemeClr val="lt1"/>
+              </a:fontRef>
+            </p:style>
+            <p:txBody>
+              <a:bodyPr rtlCol="0" anchor="ctr"/>
+              <a:lstStyle/>
+              <a:p>
+                <a:pPr algn="ctr"/>
+                <a:endParaRPr lang="es-419"/>
+              </a:p>
+            </p:txBody>
+          </p:sp>
+          <p:sp>
+            <p:nvSpPr>
+              <p:cNvPr id="30" name="Rectángulo 29">
+                <a:extLst>
+                  <a:ext uri="{FF2B5EF4-FFF2-40B4-BE49-F238E27FC236}">
+                    <a16:creationId xmlns:a16="http://schemas.microsoft.com/office/drawing/2014/main" id="{5BCA33C6-B94C-482A-A892-BC35075C2B7B}"/>
+                  </a:ext>
+                </a:extLst>
+              </p:cNvPr>
+              <p:cNvSpPr/>
+              <p:nvPr/>
+            </p:nvSpPr>
+            <p:spPr>
+              <a:xfrm rot="5400000" flipV="1">
+                <a:off x="6678606" y="3646715"/>
+                <a:ext cx="157388" cy="45719"/>
+              </a:xfrm>
+              <a:prstGeom prst="rect">
+                <a:avLst/>
+              </a:prstGeom>
+              <a:solidFill>
+                <a:srgbClr val="33949A"/>
+              </a:solidFill>
+              <a:ln>
+                <a:noFill/>
+              </a:ln>
+            </p:spPr>
+            <p:style>
+              <a:lnRef idx="2">
+                <a:schemeClr val="accent1">
+                  <a:shade val="50000"/>
+                </a:schemeClr>
+              </a:lnRef>
+              <a:fillRef idx="1">
+                <a:schemeClr val="accent1"/>
+              </a:fillRef>
+              <a:effectRef idx="0">
+                <a:schemeClr val="accent1"/>
+              </a:effectRef>
+              <a:fontRef idx="minor">
+                <a:schemeClr val="lt1"/>
+              </a:fontRef>
+            </p:style>
+            <p:txBody>
+              <a:bodyPr rtlCol="0" anchor="ctr"/>
+              <a:lstStyle/>
+              <a:p>
+                <a:pPr algn="ctr"/>
+                <a:endParaRPr lang="es-419"/>
+              </a:p>
+            </p:txBody>
+          </p:sp>
+        </p:grpSp>
+        <p:sp>
+          <p:nvSpPr>
+            <p:cNvPr id="33" name="Elipse 32">
+              <a:extLst>
+                <a:ext uri="{FF2B5EF4-FFF2-40B4-BE49-F238E27FC236}">
+                  <a16:creationId xmlns:a16="http://schemas.microsoft.com/office/drawing/2014/main" id="{60FC0F6B-E12E-42DA-9DAA-922FB6962DF4}"/>
+                </a:ext>
+              </a:extLst>
+            </p:cNvPr>
+            <p:cNvSpPr/>
+            <p:nvPr/>
+          </p:nvSpPr>
+          <p:spPr>
+            <a:xfrm>
+              <a:off x="5851866" y="4765827"/>
+              <a:ext cx="488265" cy="66848"/>
+            </a:xfrm>
+            <a:prstGeom prst="ellipse">
+              <a:avLst/>
+            </a:prstGeom>
+            <a:solidFill>
+              <a:srgbClr val="697789"/>
+            </a:solidFill>
+            <a:ln>
+              <a:noFill/>
+            </a:ln>
+          </p:spPr>
+          <p:style>
+            <a:lnRef idx="2">
+              <a:schemeClr val="accent1">
+                <a:shade val="50000"/>
+              </a:schemeClr>
+            </a:lnRef>
+            <a:fillRef idx="1">
+              <a:schemeClr val="accent1"/>
+            </a:fillRef>
+            <a:effectRef idx="0">
+              <a:schemeClr val="accent1"/>
+            </a:effectRef>
+            <a:fontRef idx="minor">
+              <a:schemeClr val="lt1"/>
+            </a:fontRef>
+          </p:style>
+          <p:txBody>
+            <a:bodyPr rtlCol="0" anchor="ctr"/>
+            <a:lstStyle/>
+            <a:p>
+              <a:pPr algn="ctr"/>
+              <a:endParaRPr lang="es-419"/>
+            </a:p>
+          </p:txBody>
+        </p:sp>
+        <p:sp>
+          <p:nvSpPr>
+            <p:cNvPr id="11" name="Rectángulo 10">
+              <a:extLst>
+                <a:ext uri="{FF2B5EF4-FFF2-40B4-BE49-F238E27FC236}">
+                  <a16:creationId xmlns:a16="http://schemas.microsoft.com/office/drawing/2014/main" id="{78BF9C01-5BE1-4121-89FB-9E5A7EEEA7E3}"/>
+                </a:ext>
+              </a:extLst>
+            </p:cNvPr>
+            <p:cNvSpPr/>
+            <p:nvPr/>
+          </p:nvSpPr>
+          <p:spPr>
+            <a:xfrm>
+              <a:off x="5851866" y="4404484"/>
+              <a:ext cx="488265" cy="391109"/>
+            </a:xfrm>
+            <a:prstGeom prst="rect">
+              <a:avLst/>
+            </a:prstGeom>
+            <a:solidFill>
+              <a:srgbClr val="697789"/>
+            </a:solidFill>
+            <a:ln>
+              <a:noFill/>
+            </a:ln>
+          </p:spPr>
+          <p:style>
+            <a:lnRef idx="2">
+              <a:schemeClr val="accent1">
+                <a:shade val="50000"/>
+              </a:schemeClr>
+            </a:lnRef>
+            <a:fillRef idx="1">
+              <a:schemeClr val="accent1"/>
+            </a:fillRef>
+            <a:effectRef idx="0">
+              <a:schemeClr val="accent1"/>
+            </a:effectRef>
+            <a:fontRef idx="minor">
+              <a:schemeClr val="lt1"/>
+            </a:fontRef>
+          </p:style>
+          <p:txBody>
+            <a:bodyPr rtlCol="0" anchor="ctr"/>
+            <a:lstStyle/>
+            <a:p>
+              <a:pPr algn="ctr"/>
+              <a:endParaRPr lang="es-419"/>
+            </a:p>
+          </p:txBody>
+        </p:sp>
+      </p:grpSp>
+      <p:sp>
+        <p:nvSpPr>
+          <p:cNvPr id="4" name="Rectángulo: esquinas redondeadas 3">
+            <a:extLst>
+              <a:ext uri="{FF2B5EF4-FFF2-40B4-BE49-F238E27FC236}">
+                <a16:creationId xmlns:a16="http://schemas.microsoft.com/office/drawing/2014/main" id="{D243FB7A-C3DD-4F9A-86EE-6DC59CCDB267}"/>
+              </a:ext>
+            </a:extLst>
+          </p:cNvPr>
+          <p:cNvSpPr/>
+          <p:nvPr/>
+        </p:nvSpPr>
+        <p:spPr>
+          <a:xfrm>
+            <a:off x="893240" y="835374"/>
+            <a:ext cx="10130360" cy="3569110"/>
+          </a:xfrm>
+          <a:prstGeom prst="roundRect">
+            <a:avLst>
+              <a:gd name="adj" fmla="val 4863"/>
+            </a:avLst>
+          </a:prstGeom>
+          <a:solidFill>
+            <a:srgbClr val="57585A"/>
+          </a:solidFill>
+          <a:ln>
+            <a:noFill/>
+          </a:ln>
+        </p:spPr>
+        <p:style>
+          <a:lnRef idx="2">
+            <a:schemeClr val="accent1">
+              <a:shade val="50000"/>
+            </a:schemeClr>
+          </a:lnRef>
+          <a:fillRef idx="1">
+            <a:schemeClr val="accent1"/>
+          </a:fillRef>
+          <a:effectRef idx="0">
+            <a:schemeClr val="accent1"/>
+          </a:effectRef>
+          <a:fontRef idx="minor">
+            <a:schemeClr val="lt1"/>
+          </a:fontRef>
+        </p:style>
+        <p:txBody>
+          <a:bodyPr rtlCol="0" anchor="ctr"/>
+          <a:lstStyle/>
+          <a:p>
+            <a:pPr algn="ctr"/>
+            <a:endParaRPr lang="es-419"/>
+          </a:p>
+        </p:txBody>
+      </p:sp>
+      <p:sp>
+        <p:nvSpPr>
+          <p:cNvPr id="42" name="Rectángulo: esquinas redondeadas 41">
+            <a:extLst>
+              <a:ext uri="{FF2B5EF4-FFF2-40B4-BE49-F238E27FC236}">
+                <a16:creationId xmlns:a16="http://schemas.microsoft.com/office/drawing/2014/main" id="{BBDF4808-2BBE-4169-BEA6-BE70E086C559}"/>
+              </a:ext>
+            </a:extLst>
+          </p:cNvPr>
+          <p:cNvSpPr/>
+          <p:nvPr/>
+        </p:nvSpPr>
+        <p:spPr>
+          <a:xfrm>
+            <a:off x="7914640" y="835374"/>
+            <a:ext cx="3108960" cy="3569110"/>
+          </a:xfrm>
+          <a:prstGeom prst="roundRect">
+            <a:avLst>
+              <a:gd name="adj" fmla="val 4863"/>
+            </a:avLst>
+          </a:prstGeom>
+          <a:solidFill>
+            <a:srgbClr val="6A6D6D"/>
+          </a:solidFill>
+          <a:ln>
+            <a:noFill/>
+          </a:ln>
+        </p:spPr>
+        <p:style>
+          <a:lnRef idx="2">
+            <a:schemeClr val="accent1">
+              <a:shade val="50000"/>
+            </a:schemeClr>
+          </a:lnRef>
+          <a:fillRef idx="1">
+            <a:schemeClr val="accent1"/>
+          </a:fillRef>
+          <a:effectRef idx="0">
+            <a:schemeClr val="accent1"/>
+          </a:effectRef>
+          <a:fontRef idx="minor">
+            <a:schemeClr val="lt1"/>
+          </a:fontRef>
+        </p:style>
+        <p:txBody>
+          <a:bodyPr rtlCol="0" anchor="ctr"/>
+          <a:lstStyle/>
+          <a:p>
+            <a:pPr algn="ctr"/>
+            <a:endParaRPr lang="es-419"/>
+          </a:p>
+        </p:txBody>
+      </p:sp>
+      <p:sp>
+        <p:nvSpPr>
+          <p:cNvPr id="43" name="Triángulo isósceles 42">
+            <a:extLst>
+              <a:ext uri="{FF2B5EF4-FFF2-40B4-BE49-F238E27FC236}">
+                <a16:creationId xmlns:a16="http://schemas.microsoft.com/office/drawing/2014/main" id="{4BBFC94A-8B93-4200-BA3A-2CE7995FBD74}"/>
+              </a:ext>
+            </a:extLst>
+          </p:cNvPr>
+          <p:cNvSpPr/>
+          <p:nvPr/>
+        </p:nvSpPr>
+        <p:spPr>
+          <a:xfrm>
+            <a:off x="4564748" y="835374"/>
+            <a:ext cx="3390532" cy="3569110"/>
+          </a:xfrm>
+          <a:prstGeom prst="triangle">
+            <a:avLst>
+              <a:gd name="adj" fmla="val 100000"/>
+            </a:avLst>
+          </a:prstGeom>
+          <a:solidFill>
+            <a:srgbClr val="6A6D6D"/>
+          </a:solidFill>
+          <a:ln>
+            <a:noFill/>
+          </a:ln>
+        </p:spPr>
+        <p:style>
+          <a:lnRef idx="2">
+            <a:schemeClr val="accent1">
+              <a:shade val="50000"/>
+            </a:schemeClr>
+          </a:lnRef>
+          <a:fillRef idx="1">
+            <a:schemeClr val="accent1"/>
+          </a:fillRef>
+          <a:effectRef idx="0">
+            <a:schemeClr val="accent1"/>
+          </a:effectRef>
+          <a:fontRef idx="minor">
+            <a:schemeClr val="lt1"/>
+          </a:fontRef>
+        </p:style>
+        <p:txBody>
+          <a:bodyPr rtlCol="0" anchor="ctr"/>
+          <a:lstStyle/>
+          <a:p>
+            <a:pPr algn="ctr"/>
+            <a:endParaRPr lang="es-419"/>
+          </a:p>
+        </p:txBody>
+      </p:sp>
+      <p:sp>
+        <p:nvSpPr>
+          <p:cNvPr id="6" name="Rectángulo 5">
+            <a:extLst>
+              <a:ext uri="{FF2B5EF4-FFF2-40B4-BE49-F238E27FC236}">
+                <a16:creationId xmlns:a16="http://schemas.microsoft.com/office/drawing/2014/main" id="{342D79D1-6E92-49CE-866C-60F0054DE1EF}"/>
+              </a:ext>
+            </a:extLst>
+          </p:cNvPr>
+          <p:cNvSpPr/>
+          <p:nvPr/>
+        </p:nvSpPr>
+        <p:spPr>
+          <a:xfrm>
+            <a:off x="1049424" y="982858"/>
+            <a:ext cx="9811616" cy="3274142"/>
+          </a:xfrm>
+          <a:prstGeom prst="rect">
+            <a:avLst/>
+          </a:prstGeom>
+          <a:solidFill>
+            <a:srgbClr val="FFFFFF"/>
+          </a:solidFill>
+          <a:ln>
+            <a:noFill/>
+          </a:ln>
+        </p:spPr>
+        <p:style>
+          <a:lnRef idx="2">
+            <a:schemeClr val="accent1">
+              <a:shade val="50000"/>
+            </a:schemeClr>
+          </a:lnRef>
+          <a:fillRef idx="1">
+            <a:schemeClr val="accent1"/>
+          </a:fillRef>
+          <a:effectRef idx="0">
+            <a:schemeClr val="accent1"/>
+          </a:effectRef>
+          <a:fontRef idx="minor">
+            <a:schemeClr val="lt1"/>
+          </a:fontRef>
+        </p:style>
+        <p:txBody>
+          <a:bodyPr rtlCol="0" anchor="ctr"/>
+          <a:lstStyle/>
+          <a:p>
+            <a:pPr algn="ctr"/>
+            <a:endParaRPr lang="es-419"/>
+          </a:p>
+        </p:txBody>
+      </p:sp>
+      <p:sp>
+        <p:nvSpPr>
+          <p:cNvPr id="44" name="Rectángulo 43">
+            <a:extLst>
+              <a:ext uri="{FF2B5EF4-FFF2-40B4-BE49-F238E27FC236}">
+                <a16:creationId xmlns:a16="http://schemas.microsoft.com/office/drawing/2014/main" id="{1439137F-1F5C-4D3C-A265-A7F5C965CC74}"/>
+              </a:ext>
+            </a:extLst>
+          </p:cNvPr>
+          <p:cNvSpPr/>
+          <p:nvPr/>
+        </p:nvSpPr>
+        <p:spPr>
+          <a:xfrm>
+            <a:off x="7955280" y="835374"/>
+            <a:ext cx="873760" cy="147484"/>
+          </a:xfrm>
+          <a:prstGeom prst="rect">
+            <a:avLst/>
+          </a:prstGeom>
+          <a:solidFill>
+            <a:srgbClr val="6A6D6D"/>
+          </a:solidFill>
+          <a:ln>
+            <a:noFill/>
+          </a:ln>
+        </p:spPr>
+        <p:style>
+          <a:lnRef idx="2">
+            <a:schemeClr val="accent1">
+              <a:shade val="50000"/>
+            </a:schemeClr>
+          </a:lnRef>
+          <a:fillRef idx="1">
+            <a:schemeClr val="accent1"/>
+          </a:fillRef>
+          <a:effectRef idx="0">
+            <a:schemeClr val="accent1"/>
+          </a:effectRef>
+          <a:fontRef idx="minor">
+            <a:schemeClr val="lt1"/>
+          </a:fontRef>
+        </p:style>
+        <p:txBody>
+          <a:bodyPr rtlCol="0" anchor="ctr"/>
+          <a:lstStyle/>
+          <a:p>
+            <a:pPr algn="ctr"/>
+            <a:endParaRPr lang="es-419"/>
+          </a:p>
+        </p:txBody>
+      </p:sp>
+      <p:sp>
+        <p:nvSpPr>
+          <p:cNvPr id="45" name="Rectángulo 44">
+            <a:extLst>
+              <a:ext uri="{FF2B5EF4-FFF2-40B4-BE49-F238E27FC236}">
+                <a16:creationId xmlns:a16="http://schemas.microsoft.com/office/drawing/2014/main" id="{1172B2B0-356D-46C2-B1F3-9C612E736229}"/>
+              </a:ext>
+            </a:extLst>
+          </p:cNvPr>
+          <p:cNvSpPr/>
+          <p:nvPr/>
+        </p:nvSpPr>
+        <p:spPr>
+          <a:xfrm>
+            <a:off x="7625933" y="4270130"/>
+            <a:ext cx="873760" cy="133271"/>
+          </a:xfrm>
+          <a:prstGeom prst="rect">
+            <a:avLst/>
+          </a:prstGeom>
+          <a:solidFill>
+            <a:srgbClr val="6A6D6D"/>
+          </a:solidFill>
+          <a:ln>
+            <a:noFill/>
+          </a:ln>
+        </p:spPr>
+        <p:style>
+          <a:lnRef idx="2">
+            <a:schemeClr val="accent1">
+              <a:shade val="50000"/>
+            </a:schemeClr>
+          </a:lnRef>
+          <a:fillRef idx="1">
+            <a:schemeClr val="accent1"/>
+          </a:fillRef>
+          <a:effectRef idx="0">
+            <a:schemeClr val="accent1"/>
+          </a:effectRef>
+          <a:fontRef idx="minor">
+            <a:schemeClr val="lt1"/>
+          </a:fontRef>
+        </p:style>
+        <p:txBody>
+          <a:bodyPr rtlCol="0" anchor="ctr"/>
+          <a:lstStyle/>
+          <a:p>
+            <a:pPr algn="ctr"/>
+            <a:endParaRPr lang="es-419"/>
+          </a:p>
+        </p:txBody>
+      </p:sp>
+      <p:sp>
+        <p:nvSpPr>
+          <p:cNvPr id="46" name="Rectángulo 45">
+            <a:extLst>
+              <a:ext uri="{FF2B5EF4-FFF2-40B4-BE49-F238E27FC236}">
+                <a16:creationId xmlns:a16="http://schemas.microsoft.com/office/drawing/2014/main" id="{393AF7C5-06E4-4E0F-816E-68F4BAE6B89C}"/>
+              </a:ext>
+            </a:extLst>
+          </p:cNvPr>
+          <p:cNvSpPr/>
+          <p:nvPr/>
+        </p:nvSpPr>
+        <p:spPr>
+          <a:xfrm>
+            <a:off x="1049420" y="982994"/>
+            <a:ext cx="9811618" cy="84509"/>
+          </a:xfrm>
+          <a:prstGeom prst="rect">
+            <a:avLst/>
+          </a:prstGeom>
+          <a:solidFill>
+            <a:srgbClr val="217346"/>
+          </a:solidFill>
+          <a:ln>
+            <a:noFill/>
+          </a:ln>
+        </p:spPr>
+        <p:style>
+          <a:lnRef idx="2">
+            <a:schemeClr val="accent1">
+              <a:shade val="50000"/>
+            </a:schemeClr>
+          </a:lnRef>
+          <a:fillRef idx="1">
+            <a:schemeClr val="accent1"/>
+          </a:fillRef>
+          <a:effectRef idx="0">
+            <a:schemeClr val="accent1"/>
+          </a:effectRef>
+          <a:fontRef idx="minor">
+            <a:schemeClr val="lt1"/>
+          </a:fontRef>
+        </p:style>
+        <p:txBody>
+          <a:bodyPr rtlCol="0" anchor="ctr"/>
+          <a:lstStyle/>
+          <a:p>
+            <a:pPr algn="ctr"/>
+            <a:endParaRPr lang="es-419"/>
+          </a:p>
+        </p:txBody>
+      </p:sp>
+      <p:sp>
+        <p:nvSpPr>
+          <p:cNvPr id="47" name="Rectángulo 46">
+            <a:extLst>
+              <a:ext uri="{FF2B5EF4-FFF2-40B4-BE49-F238E27FC236}">
+                <a16:creationId xmlns:a16="http://schemas.microsoft.com/office/drawing/2014/main" id="{8BAE81A3-6000-4574-BE95-A05F51B0F5E9}"/>
+              </a:ext>
+            </a:extLst>
+          </p:cNvPr>
+          <p:cNvSpPr/>
+          <p:nvPr/>
+        </p:nvSpPr>
+        <p:spPr>
+          <a:xfrm>
+            <a:off x="1049419" y="1068586"/>
+            <a:ext cx="9811616" cy="187750"/>
+          </a:xfrm>
+          <a:prstGeom prst="rect">
+            <a:avLst/>
+          </a:prstGeom>
+          <a:solidFill>
+            <a:srgbClr val="F3F3F3"/>
+          </a:solidFill>
+          <a:ln>
+            <a:noFill/>
+          </a:ln>
+        </p:spPr>
+        <p:style>
+          <a:lnRef idx="2">
+            <a:schemeClr val="accent1">
+              <a:shade val="50000"/>
+            </a:schemeClr>
+          </a:lnRef>
+          <a:fillRef idx="1">
+            <a:schemeClr val="accent1"/>
+          </a:fillRef>
+          <a:effectRef idx="0">
+            <a:schemeClr val="accent1"/>
+          </a:effectRef>
+          <a:fontRef idx="minor">
+            <a:schemeClr val="lt1"/>
+          </a:fontRef>
+        </p:style>
+        <p:txBody>
+          <a:bodyPr rtlCol="0" anchor="ctr"/>
+          <a:lstStyle/>
+          <a:p>
+            <a:pPr algn="ctr"/>
+            <a:endParaRPr lang="es-419"/>
+          </a:p>
+        </p:txBody>
+      </p:sp>
+      <p:sp>
+        <p:nvSpPr>
+          <p:cNvPr id="49" name="Signo de multiplicación 48">
+            <a:extLst>
+              <a:ext uri="{FF2B5EF4-FFF2-40B4-BE49-F238E27FC236}">
+                <a16:creationId xmlns:a16="http://schemas.microsoft.com/office/drawing/2014/main" id="{26EBD8E6-B5BB-4846-95BA-17AE0C1C3A2A}"/>
+              </a:ext>
+            </a:extLst>
+          </p:cNvPr>
+          <p:cNvSpPr/>
+          <p:nvPr/>
+        </p:nvSpPr>
+        <p:spPr>
+          <a:xfrm>
+            <a:off x="10773727" y="985286"/>
+            <a:ext cx="81593" cy="75756"/>
+          </a:xfrm>
+          <a:prstGeom prst="mathMultiply">
+            <a:avLst>
+              <a:gd name="adj1" fmla="val 13236"/>
+            </a:avLst>
+          </a:prstGeom>
+          <a:solidFill>
+            <a:srgbClr val="F3F3F3"/>
+          </a:solidFill>
+          <a:ln>
+            <a:noFill/>
+          </a:ln>
+        </p:spPr>
+        <p:style>
+          <a:lnRef idx="2">
+            <a:schemeClr val="accent1">
+              <a:shade val="50000"/>
+            </a:schemeClr>
+          </a:lnRef>
+          <a:fillRef idx="1">
+            <a:schemeClr val="accent1"/>
+          </a:fillRef>
+          <a:effectRef idx="0">
+            <a:schemeClr val="accent1"/>
+          </a:effectRef>
+          <a:fontRef idx="minor">
+            <a:schemeClr val="lt1"/>
+          </a:fontRef>
+        </p:style>
+        <p:txBody>
+          <a:bodyPr rtlCol="0" anchor="ctr"/>
+          <a:lstStyle/>
+          <a:p>
+            <a:pPr algn="ctr"/>
+            <a:endParaRPr lang="es-419"/>
+          </a:p>
+        </p:txBody>
+      </p:sp>
+    </p:spTree>
+    <p:extLst>
+      <p:ext uri="{BB962C8B-B14F-4D97-AF65-F5344CB8AC3E}">
+        <p14:creationId xmlns:p14="http://schemas.microsoft.com/office/powerpoint/2010/main" val="1408828785"/>
+      </p:ext>
+    </p:extLst>
+  </p:cSld>
+  <p:clrMapOvr>
+    <a:masterClrMapping/>
+  </p:clrMapOvr>
+</p:sld>
+</file>
+
+<file path=ppt/slides/slide13.xml><?xml version="1.0" encoding="utf-8"?>
+<p:sld xmlns:a="http://schemas.openxmlformats.org/drawingml/2006/main" xmlns:r="http://schemas.openxmlformats.org/officeDocument/2006/relationships" xmlns:p="http://schemas.openxmlformats.org/presentationml/2006/main">
+  <p:cSld>
+    <p:spTree>
+      <p:nvGrpSpPr>
+        <p:cNvPr id="1" name=""/>
+        <p:cNvGrpSpPr/>
+        <p:nvPr/>
+      </p:nvGrpSpPr>
+      <p:grpSpPr>
+        <a:xfrm>
+          <a:off x="0" y="0"/>
+          <a:ext cx="0" cy="0"/>
+          <a:chOff x="0" y="0"/>
+          <a:chExt cx="0" cy="0"/>
+        </a:xfrm>
+      </p:grpSpPr>
+      <p:pic>
+        <p:nvPicPr>
+          <p:cNvPr id="5" name="Imagen 4">
+            <a:extLst>
+              <a:ext uri="{FF2B5EF4-FFF2-40B4-BE49-F238E27FC236}">
+                <a16:creationId xmlns:a16="http://schemas.microsoft.com/office/drawing/2014/main" id="{32F22644-81F6-4721-9AE4-51158DE44E64}"/>
+              </a:ext>
+            </a:extLst>
+          </p:cNvPr>
+          <p:cNvPicPr>
+            <a:picLocks noChangeAspect="1"/>
+          </p:cNvPicPr>
+          <p:nvPr/>
+        </p:nvPicPr>
+        <p:blipFill>
+          <a:blip r:embed="rId2">
+            <a:extLst>
+              <a:ext uri="{28A0092B-C50C-407E-A947-70E740481C1C}">
+                <a14:useLocalDpi xmlns:a14="http://schemas.microsoft.com/office/drawing/2010/main" val="0"/>
+              </a:ext>
+            </a:extLst>
+          </a:blip>
+          <a:stretch>
+            <a:fillRect/>
+          </a:stretch>
+        </p:blipFill>
+        <p:spPr>
+          <a:xfrm>
+            <a:off x="609123" y="728238"/>
+            <a:ext cx="10769926" cy="5401524"/>
+          </a:xfrm>
+          <a:prstGeom prst="rect">
+            <a:avLst/>
+          </a:prstGeom>
+        </p:spPr>
+      </p:pic>
+      <p:sp>
+        <p:nvSpPr>
+          <p:cNvPr id="10" name="Rectángulo 9">
+            <a:extLst>
+              <a:ext uri="{FF2B5EF4-FFF2-40B4-BE49-F238E27FC236}">
+                <a16:creationId xmlns:a16="http://schemas.microsoft.com/office/drawing/2014/main" id="{94F7D03F-AA83-4647-A5ED-FFF29A679BDC}"/>
+              </a:ext>
+            </a:extLst>
+          </p:cNvPr>
+          <p:cNvSpPr/>
+          <p:nvPr/>
+        </p:nvSpPr>
+        <p:spPr>
+          <a:xfrm>
+            <a:off x="703006" y="870154"/>
+            <a:ext cx="10676044" cy="4016477"/>
+          </a:xfrm>
+          <a:prstGeom prst="rect">
+            <a:avLst/>
+          </a:prstGeom>
+          <a:solidFill>
+            <a:srgbClr val="4FB5C1"/>
+          </a:solidFill>
+          <a:ln>
+            <a:noFill/>
+          </a:ln>
+        </p:spPr>
+        <p:style>
+          <a:lnRef idx="2">
+            <a:schemeClr val="accent1">
+              <a:shade val="50000"/>
+            </a:schemeClr>
+          </a:lnRef>
+          <a:fillRef idx="1">
+            <a:schemeClr val="accent1"/>
+          </a:fillRef>
+          <a:effectRef idx="0">
+            <a:schemeClr val="accent1"/>
+          </a:effectRef>
+          <a:fontRef idx="minor">
+            <a:schemeClr val="lt1"/>
+          </a:fontRef>
+        </p:style>
+        <p:txBody>
+          <a:bodyPr rtlCol="0" anchor="ctr"/>
+          <a:lstStyle/>
+          <a:p>
+            <a:pPr algn="ctr"/>
+            <a:endParaRPr lang="es-419"/>
+          </a:p>
+        </p:txBody>
+      </p:sp>
+      <p:sp>
+        <p:nvSpPr>
+          <p:cNvPr id="15" name="Rectángulo 14">
+            <a:extLst>
+              <a:ext uri="{FF2B5EF4-FFF2-40B4-BE49-F238E27FC236}">
+                <a16:creationId xmlns:a16="http://schemas.microsoft.com/office/drawing/2014/main" id="{11CF474B-DDD4-48EB-92A2-5AF9A584D5AE}"/>
+              </a:ext>
+            </a:extLst>
+          </p:cNvPr>
+          <p:cNvSpPr/>
+          <p:nvPr/>
+        </p:nvSpPr>
+        <p:spPr>
+          <a:xfrm>
+            <a:off x="609123" y="4648324"/>
+            <a:ext cx="10769926" cy="476614"/>
+          </a:xfrm>
+          <a:prstGeom prst="rect">
+            <a:avLst/>
+          </a:prstGeom>
+          <a:solidFill>
+            <a:srgbClr val="33949A"/>
+          </a:solidFill>
+          <a:ln>
+            <a:noFill/>
+          </a:ln>
+        </p:spPr>
+        <p:style>
+          <a:lnRef idx="2">
+            <a:schemeClr val="accent1">
+              <a:shade val="50000"/>
+            </a:schemeClr>
+          </a:lnRef>
+          <a:fillRef idx="1">
+            <a:schemeClr val="accent1"/>
+          </a:fillRef>
+          <a:effectRef idx="0">
+            <a:schemeClr val="accent1"/>
+          </a:effectRef>
+          <a:fontRef idx="minor">
+            <a:schemeClr val="lt1"/>
+          </a:fontRef>
+        </p:style>
+        <p:txBody>
+          <a:bodyPr rtlCol="0" anchor="ctr"/>
+          <a:lstStyle/>
+          <a:p>
+            <a:pPr algn="ctr"/>
+            <a:endParaRPr lang="es-419"/>
+          </a:p>
+        </p:txBody>
+      </p:sp>
+      <p:grpSp>
+        <p:nvGrpSpPr>
+          <p:cNvPr id="3" name="Grupo 2">
+            <a:extLst>
+              <a:ext uri="{FF2B5EF4-FFF2-40B4-BE49-F238E27FC236}">
+                <a16:creationId xmlns:a16="http://schemas.microsoft.com/office/drawing/2014/main" id="{126DC54C-87CA-476C-BA8D-E093DE315B1F}"/>
+              </a:ext>
+            </a:extLst>
+          </p:cNvPr>
+          <p:cNvGrpSpPr/>
+          <p:nvPr/>
+        </p:nvGrpSpPr>
+        <p:grpSpPr>
+          <a:xfrm>
+            <a:off x="811157" y="941839"/>
+            <a:ext cx="5100846" cy="4101540"/>
+            <a:chOff x="811157" y="941839"/>
+            <a:chExt cx="5100846" cy="4101540"/>
+          </a:xfrm>
+        </p:grpSpPr>
+        <p:sp>
+          <p:nvSpPr>
+            <p:cNvPr id="8" name="Rectángulo: esquinas redondeadas 7">
+              <a:extLst>
+                <a:ext uri="{FF2B5EF4-FFF2-40B4-BE49-F238E27FC236}">
+                  <a16:creationId xmlns:a16="http://schemas.microsoft.com/office/drawing/2014/main" id="{3C96070C-B559-466F-BE0B-582A09FD6D6E}"/>
+                </a:ext>
+              </a:extLst>
+            </p:cNvPr>
+            <p:cNvSpPr/>
+            <p:nvPr/>
+          </p:nvSpPr>
+          <p:spPr>
+            <a:xfrm>
+              <a:off x="811157" y="941839"/>
+              <a:ext cx="5100846" cy="3569110"/>
+            </a:xfrm>
+            <a:prstGeom prst="roundRect">
+              <a:avLst>
+                <a:gd name="adj" fmla="val 4863"/>
+              </a:avLst>
+            </a:prstGeom>
+            <a:solidFill>
+              <a:srgbClr val="57585A"/>
+            </a:solidFill>
+            <a:ln>
+              <a:noFill/>
+            </a:ln>
+          </p:spPr>
+          <p:style>
+            <a:lnRef idx="2">
+              <a:schemeClr val="accent1">
+                <a:shade val="50000"/>
+              </a:schemeClr>
+            </a:lnRef>
+            <a:fillRef idx="1">
+              <a:schemeClr val="accent1"/>
+            </a:fillRef>
+            <a:effectRef idx="0">
+              <a:schemeClr val="accent1"/>
+            </a:effectRef>
+            <a:fontRef idx="minor">
+              <a:schemeClr val="lt1"/>
+            </a:fontRef>
+          </p:style>
+          <p:txBody>
+            <a:bodyPr rtlCol="0" anchor="ctr"/>
+            <a:lstStyle/>
+            <a:p>
+              <a:pPr algn="ctr"/>
+              <a:endParaRPr lang="es-419"/>
+            </a:p>
+          </p:txBody>
+        </p:sp>
+        <p:sp>
+          <p:nvSpPr>
+            <p:cNvPr id="9" name="Rectángulo 8">
+              <a:extLst>
+                <a:ext uri="{FF2B5EF4-FFF2-40B4-BE49-F238E27FC236}">
+                  <a16:creationId xmlns:a16="http://schemas.microsoft.com/office/drawing/2014/main" id="{EAF2522F-C6E5-494A-853E-D291B3795D66}"/>
+                </a:ext>
+              </a:extLst>
+            </p:cNvPr>
+            <p:cNvSpPr/>
+            <p:nvPr/>
+          </p:nvSpPr>
+          <p:spPr>
+            <a:xfrm>
+              <a:off x="978304" y="1079491"/>
+              <a:ext cx="4770413" cy="3274142"/>
+            </a:xfrm>
+            <a:prstGeom prst="rect">
+              <a:avLst/>
+            </a:prstGeom>
+            <a:solidFill>
+              <a:srgbClr val="FFFFFF"/>
+            </a:solidFill>
+            <a:ln>
+              <a:noFill/>
+            </a:ln>
+          </p:spPr>
+          <p:style>
+            <a:lnRef idx="2">
+              <a:schemeClr val="accent1">
+                <a:shade val="50000"/>
+              </a:schemeClr>
+            </a:lnRef>
+            <a:fillRef idx="1">
+              <a:schemeClr val="accent1"/>
+            </a:fillRef>
+            <a:effectRef idx="0">
+              <a:schemeClr val="accent1"/>
+            </a:effectRef>
+            <a:fontRef idx="minor">
+              <a:schemeClr val="lt1"/>
+            </a:fontRef>
+          </p:style>
+          <p:txBody>
+            <a:bodyPr rtlCol="0" anchor="ctr"/>
+            <a:lstStyle/>
+            <a:p>
+              <a:pPr algn="ctr"/>
+              <a:endParaRPr lang="es-419"/>
+            </a:p>
+          </p:txBody>
+        </p:sp>
+        <p:grpSp>
+          <p:nvGrpSpPr>
+            <p:cNvPr id="2" name="Grupo 1">
+              <a:extLst>
+                <a:ext uri="{FF2B5EF4-FFF2-40B4-BE49-F238E27FC236}">
+                  <a16:creationId xmlns:a16="http://schemas.microsoft.com/office/drawing/2014/main" id="{F80E560C-2C45-4450-9FFB-A3B02C340112}"/>
+                </a:ext>
+              </a:extLst>
+            </p:cNvPr>
+            <p:cNvGrpSpPr/>
+            <p:nvPr/>
+          </p:nvGrpSpPr>
+          <p:grpSpPr>
+            <a:xfrm>
+              <a:off x="2486884" y="4510949"/>
+              <a:ext cx="1749392" cy="532430"/>
+              <a:chOff x="2471419" y="4445970"/>
+              <a:chExt cx="1749392" cy="532430"/>
+            </a:xfrm>
+          </p:grpSpPr>
+          <p:sp>
+            <p:nvSpPr>
+              <p:cNvPr id="18" name="Paralelogramo 17">
+                <a:extLst>
+                  <a:ext uri="{FF2B5EF4-FFF2-40B4-BE49-F238E27FC236}">
+                    <a16:creationId xmlns:a16="http://schemas.microsoft.com/office/drawing/2014/main" id="{4C496AA3-F0C1-4825-880C-B256E4C3E6E5}"/>
+                  </a:ext>
+                </a:extLst>
+              </p:cNvPr>
+              <p:cNvSpPr/>
+              <p:nvPr/>
+            </p:nvSpPr>
+            <p:spPr>
+              <a:xfrm>
+                <a:off x="2471420" y="4650312"/>
+                <a:ext cx="1545460" cy="241930"/>
+              </a:xfrm>
+              <a:prstGeom prst="parallelogram">
+                <a:avLst>
+                  <a:gd name="adj" fmla="val 84348"/>
+                </a:avLst>
+              </a:prstGeom>
+              <a:solidFill>
+                <a:srgbClr val="929DAC"/>
+              </a:solidFill>
+              <a:ln>
+                <a:noFill/>
+              </a:ln>
+            </p:spPr>
+            <p:style>
+              <a:lnRef idx="2">
+                <a:schemeClr val="accent1">
+                  <a:shade val="50000"/>
+                </a:schemeClr>
+              </a:lnRef>
+              <a:fillRef idx="1">
+                <a:schemeClr val="accent1"/>
+              </a:fillRef>
+              <a:effectRef idx="0">
+                <a:schemeClr val="accent1"/>
+              </a:effectRef>
+              <a:fontRef idx="minor">
+                <a:schemeClr val="lt1"/>
+              </a:fontRef>
+            </p:style>
+            <p:txBody>
+              <a:bodyPr rtlCol="0" anchor="ctr"/>
+              <a:lstStyle/>
+              <a:p>
+                <a:pPr algn="ctr"/>
+                <a:endParaRPr lang="es-419"/>
+              </a:p>
+            </p:txBody>
+          </p:sp>
+          <p:sp>
+            <p:nvSpPr>
+              <p:cNvPr id="40" name="Rectángulo 39">
+                <a:extLst>
+                  <a:ext uri="{FF2B5EF4-FFF2-40B4-BE49-F238E27FC236}">
+                    <a16:creationId xmlns:a16="http://schemas.microsoft.com/office/drawing/2014/main" id="{DBEC2C6E-B0D1-4F43-8DF5-A9EE86AF5E83}"/>
+                  </a:ext>
+                </a:extLst>
+              </p:cNvPr>
+              <p:cNvSpPr/>
+              <p:nvPr/>
+            </p:nvSpPr>
+            <p:spPr>
+              <a:xfrm>
+                <a:off x="2675351" y="4445970"/>
+                <a:ext cx="1341529" cy="204342"/>
+              </a:xfrm>
+              <a:prstGeom prst="rect">
+                <a:avLst/>
+              </a:prstGeom>
+              <a:solidFill>
+                <a:srgbClr val="697789"/>
+              </a:solidFill>
+              <a:ln>
+                <a:noFill/>
+              </a:ln>
+            </p:spPr>
+            <p:style>
+              <a:lnRef idx="2">
+                <a:schemeClr val="accent1">
+                  <a:shade val="50000"/>
+                </a:schemeClr>
+              </a:lnRef>
+              <a:fillRef idx="1">
+                <a:schemeClr val="accent1"/>
+              </a:fillRef>
+              <a:effectRef idx="0">
+                <a:schemeClr val="accent1"/>
+              </a:effectRef>
+              <a:fontRef idx="minor">
+                <a:schemeClr val="lt1"/>
+              </a:fontRef>
+            </p:style>
+            <p:txBody>
+              <a:bodyPr rtlCol="0" anchor="ctr"/>
+              <a:lstStyle/>
+              <a:p>
+                <a:pPr algn="ctr"/>
+                <a:endParaRPr lang="es-419"/>
+              </a:p>
+            </p:txBody>
+          </p:sp>
+          <p:sp>
+            <p:nvSpPr>
+              <p:cNvPr id="41" name="Paralelogramo 40">
+                <a:extLst>
+                  <a:ext uri="{FF2B5EF4-FFF2-40B4-BE49-F238E27FC236}">
+                    <a16:creationId xmlns:a16="http://schemas.microsoft.com/office/drawing/2014/main" id="{AC6D27A2-620A-41AB-946E-C5E82077ECF2}"/>
+                  </a:ext>
+                </a:extLst>
+              </p:cNvPr>
+              <p:cNvSpPr/>
+              <p:nvPr/>
+            </p:nvSpPr>
+            <p:spPr>
+              <a:xfrm flipH="1">
+                <a:off x="2675351" y="4650312"/>
+                <a:ext cx="1545460" cy="241930"/>
+              </a:xfrm>
+              <a:prstGeom prst="parallelogram">
+                <a:avLst>
+                  <a:gd name="adj" fmla="val 84348"/>
+                </a:avLst>
+              </a:prstGeom>
+              <a:solidFill>
+                <a:srgbClr val="929DAC"/>
+              </a:solidFill>
+              <a:ln>
+                <a:noFill/>
+              </a:ln>
+            </p:spPr>
+            <p:style>
+              <a:lnRef idx="2">
+                <a:schemeClr val="accent1">
+                  <a:shade val="50000"/>
+                </a:schemeClr>
+              </a:lnRef>
+              <a:fillRef idx="1">
+                <a:schemeClr val="accent1"/>
+              </a:fillRef>
+              <a:effectRef idx="0">
+                <a:schemeClr val="accent1"/>
+              </a:effectRef>
+              <a:fontRef idx="minor">
+                <a:schemeClr val="lt1"/>
+              </a:fontRef>
+            </p:style>
+            <p:txBody>
+              <a:bodyPr rtlCol="0" anchor="ctr"/>
+              <a:lstStyle/>
+              <a:p>
+                <a:pPr algn="ctr"/>
+                <a:endParaRPr lang="es-419"/>
+              </a:p>
+            </p:txBody>
+          </p:sp>
+          <p:sp>
+            <p:nvSpPr>
+              <p:cNvPr id="42" name="Rectángulo 41">
+                <a:extLst>
+                  <a:ext uri="{FF2B5EF4-FFF2-40B4-BE49-F238E27FC236}">
+                    <a16:creationId xmlns:a16="http://schemas.microsoft.com/office/drawing/2014/main" id="{AFBA8D3C-E236-4175-98B7-8234B270253E}"/>
+                  </a:ext>
+                </a:extLst>
+              </p:cNvPr>
+              <p:cNvSpPr/>
+              <p:nvPr/>
+            </p:nvSpPr>
+            <p:spPr>
+              <a:xfrm>
+                <a:off x="2471419" y="4892242"/>
+                <a:ext cx="1749392" cy="86158"/>
+              </a:xfrm>
+              <a:prstGeom prst="rect">
+                <a:avLst/>
+              </a:prstGeom>
+              <a:solidFill>
+                <a:schemeClr val="bg1">
+                  <a:lumMod val="75000"/>
+                </a:schemeClr>
+              </a:solidFill>
+              <a:ln>
+                <a:noFill/>
+              </a:ln>
+            </p:spPr>
+            <p:style>
+              <a:lnRef idx="2">
+                <a:schemeClr val="accent1">
+                  <a:shade val="50000"/>
+                </a:schemeClr>
+              </a:lnRef>
+              <a:fillRef idx="1">
+                <a:schemeClr val="accent1"/>
+              </a:fillRef>
+              <a:effectRef idx="0">
+                <a:schemeClr val="accent1"/>
+              </a:effectRef>
+              <a:fontRef idx="minor">
+                <a:schemeClr val="lt1"/>
+              </a:fontRef>
+            </p:style>
+            <p:txBody>
+              <a:bodyPr rtlCol="0" anchor="ctr"/>
+              <a:lstStyle/>
+              <a:p>
+                <a:pPr algn="ctr"/>
+                <a:endParaRPr lang="es-419"/>
+              </a:p>
+            </p:txBody>
+          </p:sp>
+        </p:grpSp>
+      </p:grpSp>
+      <p:grpSp>
+        <p:nvGrpSpPr>
+          <p:cNvPr id="43" name="Grupo 42">
+            <a:extLst>
+              <a:ext uri="{FF2B5EF4-FFF2-40B4-BE49-F238E27FC236}">
+                <a16:creationId xmlns:a16="http://schemas.microsoft.com/office/drawing/2014/main" id="{798F6B6F-A2B4-4A20-942C-3156C630D30C}"/>
+              </a:ext>
+            </a:extLst>
+          </p:cNvPr>
+          <p:cNvGrpSpPr/>
+          <p:nvPr/>
+        </p:nvGrpSpPr>
+        <p:grpSpPr>
+          <a:xfrm>
+            <a:off x="6077153" y="941839"/>
+            <a:ext cx="5100846" cy="4101540"/>
+            <a:chOff x="863471" y="878348"/>
+            <a:chExt cx="5100846" cy="4101540"/>
+          </a:xfrm>
+        </p:grpSpPr>
+        <p:sp>
+          <p:nvSpPr>
+            <p:cNvPr id="44" name="Rectángulo: esquinas redondeadas 43">
+              <a:extLst>
+                <a:ext uri="{FF2B5EF4-FFF2-40B4-BE49-F238E27FC236}">
+                  <a16:creationId xmlns:a16="http://schemas.microsoft.com/office/drawing/2014/main" id="{FC2B0FFF-94EF-46B9-94E7-42E85493F4CE}"/>
+                </a:ext>
+              </a:extLst>
+            </p:cNvPr>
+            <p:cNvSpPr/>
+            <p:nvPr/>
+          </p:nvSpPr>
+          <p:spPr>
+            <a:xfrm>
+              <a:off x="863471" y="878348"/>
+              <a:ext cx="5100846" cy="3569110"/>
+            </a:xfrm>
+            <a:prstGeom prst="roundRect">
+              <a:avLst>
+                <a:gd name="adj" fmla="val 4863"/>
+              </a:avLst>
+            </a:prstGeom>
+            <a:solidFill>
+              <a:srgbClr val="57585A"/>
+            </a:solidFill>
+            <a:ln>
+              <a:noFill/>
+            </a:ln>
+          </p:spPr>
+          <p:style>
+            <a:lnRef idx="2">
+              <a:schemeClr val="accent1">
+                <a:shade val="50000"/>
+              </a:schemeClr>
+            </a:lnRef>
+            <a:fillRef idx="1">
+              <a:schemeClr val="accent1"/>
+            </a:fillRef>
+            <a:effectRef idx="0">
+              <a:schemeClr val="accent1"/>
+            </a:effectRef>
+            <a:fontRef idx="minor">
+              <a:schemeClr val="lt1"/>
+            </a:fontRef>
+          </p:style>
+          <p:txBody>
+            <a:bodyPr rtlCol="0" anchor="ctr"/>
+            <a:lstStyle/>
+            <a:p>
+              <a:pPr algn="ctr"/>
+              <a:endParaRPr lang="es-419"/>
+            </a:p>
+          </p:txBody>
+        </p:sp>
+        <p:sp>
+          <p:nvSpPr>
+            <p:cNvPr id="45" name="Rectángulo 44">
+              <a:extLst>
+                <a:ext uri="{FF2B5EF4-FFF2-40B4-BE49-F238E27FC236}">
+                  <a16:creationId xmlns:a16="http://schemas.microsoft.com/office/drawing/2014/main" id="{71F57EB1-A097-41EF-9AC2-5F4D44890A08}"/>
+                </a:ext>
+              </a:extLst>
+            </p:cNvPr>
+            <p:cNvSpPr/>
+            <p:nvPr/>
+          </p:nvSpPr>
+          <p:spPr>
+            <a:xfrm>
+              <a:off x="1031466" y="1016000"/>
+              <a:ext cx="4769565" cy="3274142"/>
+            </a:xfrm>
+            <a:prstGeom prst="rect">
+              <a:avLst/>
+            </a:prstGeom>
+            <a:solidFill>
+              <a:srgbClr val="FFFFFF"/>
+            </a:solidFill>
+            <a:ln>
+              <a:noFill/>
+            </a:ln>
+          </p:spPr>
+          <p:style>
+            <a:lnRef idx="2">
+              <a:schemeClr val="accent1">
+                <a:shade val="50000"/>
+              </a:schemeClr>
+            </a:lnRef>
+            <a:fillRef idx="1">
+              <a:schemeClr val="accent1"/>
+            </a:fillRef>
+            <a:effectRef idx="0">
+              <a:schemeClr val="accent1"/>
+            </a:effectRef>
+            <a:fontRef idx="minor">
+              <a:schemeClr val="lt1"/>
+            </a:fontRef>
+          </p:style>
+          <p:txBody>
+            <a:bodyPr rtlCol="0" anchor="ctr"/>
+            <a:lstStyle/>
+            <a:p>
+              <a:pPr algn="ctr"/>
+              <a:endParaRPr lang="es-419"/>
+            </a:p>
+          </p:txBody>
+        </p:sp>
+        <p:grpSp>
+          <p:nvGrpSpPr>
+            <p:cNvPr id="46" name="Grupo 45">
+              <a:extLst>
+                <a:ext uri="{FF2B5EF4-FFF2-40B4-BE49-F238E27FC236}">
+                  <a16:creationId xmlns:a16="http://schemas.microsoft.com/office/drawing/2014/main" id="{D70F0376-8060-4892-BA45-7BF077FFF55B}"/>
+                </a:ext>
+              </a:extLst>
+            </p:cNvPr>
+            <p:cNvGrpSpPr/>
+            <p:nvPr/>
+          </p:nvGrpSpPr>
+          <p:grpSpPr>
+            <a:xfrm>
+              <a:off x="2539198" y="4447458"/>
+              <a:ext cx="1749392" cy="532430"/>
+              <a:chOff x="2471419" y="4445970"/>
+              <a:chExt cx="1749392" cy="532430"/>
+            </a:xfrm>
+          </p:grpSpPr>
+          <p:sp>
+            <p:nvSpPr>
+              <p:cNvPr id="47" name="Paralelogramo 46">
+                <a:extLst>
+                  <a:ext uri="{FF2B5EF4-FFF2-40B4-BE49-F238E27FC236}">
+                    <a16:creationId xmlns:a16="http://schemas.microsoft.com/office/drawing/2014/main" id="{724D8711-9724-4810-8615-3448ED81D098}"/>
+                  </a:ext>
+                </a:extLst>
+              </p:cNvPr>
+              <p:cNvSpPr/>
+              <p:nvPr/>
+            </p:nvSpPr>
+            <p:spPr>
+              <a:xfrm>
+                <a:off x="2471420" y="4650312"/>
+                <a:ext cx="1545460" cy="241930"/>
+              </a:xfrm>
+              <a:prstGeom prst="parallelogram">
+                <a:avLst>
+                  <a:gd name="adj" fmla="val 84348"/>
+                </a:avLst>
+              </a:prstGeom>
+              <a:solidFill>
+                <a:srgbClr val="929DAC"/>
+              </a:solidFill>
+              <a:ln>
+                <a:noFill/>
+              </a:ln>
+            </p:spPr>
+            <p:style>
+              <a:lnRef idx="2">
+                <a:schemeClr val="accent1">
+                  <a:shade val="50000"/>
+                </a:schemeClr>
+              </a:lnRef>
+              <a:fillRef idx="1">
+                <a:schemeClr val="accent1"/>
+              </a:fillRef>
+              <a:effectRef idx="0">
+                <a:schemeClr val="accent1"/>
+              </a:effectRef>
+              <a:fontRef idx="minor">
+                <a:schemeClr val="lt1"/>
+              </a:fontRef>
+            </p:style>
+            <p:txBody>
+              <a:bodyPr rtlCol="0" anchor="ctr"/>
+              <a:lstStyle/>
+              <a:p>
+                <a:pPr algn="ctr"/>
+                <a:endParaRPr lang="es-419"/>
+              </a:p>
+            </p:txBody>
+          </p:sp>
+          <p:sp>
+            <p:nvSpPr>
+              <p:cNvPr id="48" name="Rectángulo 47">
+                <a:extLst>
+                  <a:ext uri="{FF2B5EF4-FFF2-40B4-BE49-F238E27FC236}">
+                    <a16:creationId xmlns:a16="http://schemas.microsoft.com/office/drawing/2014/main" id="{F59536A1-907F-4069-8909-63A701FB56F2}"/>
+                  </a:ext>
+                </a:extLst>
+              </p:cNvPr>
+              <p:cNvSpPr/>
+              <p:nvPr/>
+            </p:nvSpPr>
+            <p:spPr>
+              <a:xfrm>
+                <a:off x="2675351" y="4445970"/>
+                <a:ext cx="1341529" cy="204342"/>
+              </a:xfrm>
+              <a:prstGeom prst="rect">
+                <a:avLst/>
+              </a:prstGeom>
+              <a:solidFill>
+                <a:srgbClr val="697789"/>
+              </a:solidFill>
+              <a:ln>
+                <a:noFill/>
+              </a:ln>
+            </p:spPr>
+            <p:style>
+              <a:lnRef idx="2">
+                <a:schemeClr val="accent1">
+                  <a:shade val="50000"/>
+                </a:schemeClr>
+              </a:lnRef>
+              <a:fillRef idx="1">
+                <a:schemeClr val="accent1"/>
+              </a:fillRef>
+              <a:effectRef idx="0">
+                <a:schemeClr val="accent1"/>
+              </a:effectRef>
+              <a:fontRef idx="minor">
+                <a:schemeClr val="lt1"/>
+              </a:fontRef>
+            </p:style>
+            <p:txBody>
+              <a:bodyPr rtlCol="0" anchor="ctr"/>
+              <a:lstStyle/>
+              <a:p>
+                <a:pPr algn="ctr"/>
+                <a:endParaRPr lang="es-419"/>
+              </a:p>
+            </p:txBody>
+          </p:sp>
+          <p:sp>
+            <p:nvSpPr>
+              <p:cNvPr id="49" name="Paralelogramo 48">
+                <a:extLst>
+                  <a:ext uri="{FF2B5EF4-FFF2-40B4-BE49-F238E27FC236}">
+                    <a16:creationId xmlns:a16="http://schemas.microsoft.com/office/drawing/2014/main" id="{C12CDFD5-4890-4393-A33E-7AF8A53B230F}"/>
+                  </a:ext>
+                </a:extLst>
+              </p:cNvPr>
+              <p:cNvSpPr/>
+              <p:nvPr/>
+            </p:nvSpPr>
+            <p:spPr>
+              <a:xfrm flipH="1">
+                <a:off x="2675351" y="4650312"/>
+                <a:ext cx="1545460" cy="241930"/>
+              </a:xfrm>
+              <a:prstGeom prst="parallelogram">
+                <a:avLst>
+                  <a:gd name="adj" fmla="val 84348"/>
+                </a:avLst>
+              </a:prstGeom>
+              <a:solidFill>
+                <a:srgbClr val="929DAC"/>
+              </a:solidFill>
+              <a:ln>
+                <a:noFill/>
+              </a:ln>
+            </p:spPr>
+            <p:style>
+              <a:lnRef idx="2">
+                <a:schemeClr val="accent1">
+                  <a:shade val="50000"/>
+                </a:schemeClr>
+              </a:lnRef>
+              <a:fillRef idx="1">
+                <a:schemeClr val="accent1"/>
+              </a:fillRef>
+              <a:effectRef idx="0">
+                <a:schemeClr val="accent1"/>
+              </a:effectRef>
+              <a:fontRef idx="minor">
+                <a:schemeClr val="lt1"/>
+              </a:fontRef>
+            </p:style>
+            <p:txBody>
+              <a:bodyPr rtlCol="0" anchor="ctr"/>
+              <a:lstStyle/>
+              <a:p>
+                <a:pPr algn="ctr"/>
+                <a:endParaRPr lang="es-419"/>
+              </a:p>
+            </p:txBody>
+          </p:sp>
+          <p:sp>
+            <p:nvSpPr>
+              <p:cNvPr id="50" name="Rectángulo 49">
+                <a:extLst>
+                  <a:ext uri="{FF2B5EF4-FFF2-40B4-BE49-F238E27FC236}">
+                    <a16:creationId xmlns:a16="http://schemas.microsoft.com/office/drawing/2014/main" id="{EA697EFE-5D72-430F-B277-EC5DEAB067EE}"/>
+                  </a:ext>
+                </a:extLst>
+              </p:cNvPr>
+              <p:cNvSpPr/>
+              <p:nvPr/>
+            </p:nvSpPr>
+            <p:spPr>
+              <a:xfrm>
+                <a:off x="2471419" y="4892242"/>
+                <a:ext cx="1749392" cy="86158"/>
+              </a:xfrm>
+              <a:prstGeom prst="rect">
+                <a:avLst/>
+              </a:prstGeom>
+              <a:solidFill>
+                <a:schemeClr val="bg1">
+                  <a:lumMod val="75000"/>
+                </a:schemeClr>
+              </a:solidFill>
+              <a:ln>
+                <a:noFill/>
+              </a:ln>
+            </p:spPr>
+            <p:style>
+              <a:lnRef idx="2">
+                <a:schemeClr val="accent1">
+                  <a:shade val="50000"/>
+                </a:schemeClr>
+              </a:lnRef>
+              <a:fillRef idx="1">
+                <a:schemeClr val="accent1"/>
+              </a:fillRef>
+              <a:effectRef idx="0">
+                <a:schemeClr val="accent1"/>
+              </a:effectRef>
+              <a:fontRef idx="minor">
+                <a:schemeClr val="lt1"/>
+              </a:fontRef>
+            </p:style>
+            <p:txBody>
+              <a:bodyPr rtlCol="0" anchor="ctr"/>
+              <a:lstStyle/>
+              <a:p>
+                <a:pPr algn="ctr"/>
+                <a:endParaRPr lang="es-419"/>
+              </a:p>
+            </p:txBody>
+          </p:sp>
+        </p:grpSp>
+      </p:grpSp>
+      <p:sp>
+        <p:nvSpPr>
+          <p:cNvPr id="27" name="Rectángulo 26">
+            <a:extLst>
+              <a:ext uri="{FF2B5EF4-FFF2-40B4-BE49-F238E27FC236}">
+                <a16:creationId xmlns:a16="http://schemas.microsoft.com/office/drawing/2014/main" id="{94AC324A-02E2-4EFD-8EF2-12B05DD7D676}"/>
+              </a:ext>
+            </a:extLst>
+          </p:cNvPr>
+          <p:cNvSpPr/>
+          <p:nvPr/>
+        </p:nvSpPr>
+        <p:spPr>
+          <a:xfrm>
+            <a:off x="978304" y="1069795"/>
+            <a:ext cx="4770414" cy="85888"/>
+          </a:xfrm>
+          <a:prstGeom prst="rect">
+            <a:avLst/>
+          </a:prstGeom>
+          <a:solidFill>
+            <a:srgbClr val="217346"/>
+          </a:solidFill>
+          <a:ln>
+            <a:noFill/>
+          </a:ln>
+        </p:spPr>
+        <p:style>
+          <a:lnRef idx="2">
+            <a:schemeClr val="accent1">
+              <a:shade val="50000"/>
+            </a:schemeClr>
+          </a:lnRef>
+          <a:fillRef idx="1">
+            <a:schemeClr val="accent1"/>
+          </a:fillRef>
+          <a:effectRef idx="0">
+            <a:schemeClr val="accent1"/>
+          </a:effectRef>
+          <a:fontRef idx="minor">
+            <a:schemeClr val="lt1"/>
+          </a:fontRef>
+        </p:style>
+        <p:txBody>
+          <a:bodyPr rtlCol="0" anchor="ctr"/>
+          <a:lstStyle/>
+          <a:p>
+            <a:pPr algn="ctr"/>
+            <a:endParaRPr lang="es-419"/>
+          </a:p>
+        </p:txBody>
+      </p:sp>
+      <p:sp>
+        <p:nvSpPr>
+          <p:cNvPr id="28" name="Rectángulo 27">
+            <a:extLst>
+              <a:ext uri="{FF2B5EF4-FFF2-40B4-BE49-F238E27FC236}">
+                <a16:creationId xmlns:a16="http://schemas.microsoft.com/office/drawing/2014/main" id="{F63B8CA7-63AF-42E8-83CC-E0E4D710FDCA}"/>
+              </a:ext>
+            </a:extLst>
+          </p:cNvPr>
+          <p:cNvSpPr/>
+          <p:nvPr/>
+        </p:nvSpPr>
+        <p:spPr>
+          <a:xfrm>
+            <a:off x="978303" y="1155386"/>
+            <a:ext cx="4770413" cy="190813"/>
+          </a:xfrm>
+          <a:prstGeom prst="rect">
+            <a:avLst/>
+          </a:prstGeom>
+          <a:solidFill>
+            <a:srgbClr val="F3F3F3"/>
+          </a:solidFill>
+          <a:ln>
+            <a:noFill/>
+          </a:ln>
+        </p:spPr>
+        <p:style>
+          <a:lnRef idx="2">
+            <a:schemeClr val="accent1">
+              <a:shade val="50000"/>
+            </a:schemeClr>
+          </a:lnRef>
+          <a:fillRef idx="1">
+            <a:schemeClr val="accent1"/>
+          </a:fillRef>
+          <a:effectRef idx="0">
+            <a:schemeClr val="accent1"/>
+          </a:effectRef>
+          <a:fontRef idx="minor">
+            <a:schemeClr val="lt1"/>
+          </a:fontRef>
+        </p:style>
+        <p:txBody>
+          <a:bodyPr rtlCol="0" anchor="ctr"/>
+          <a:lstStyle/>
+          <a:p>
+            <a:pPr algn="ctr"/>
+            <a:endParaRPr lang="es-419"/>
+          </a:p>
+        </p:txBody>
+      </p:sp>
+      <p:sp>
+        <p:nvSpPr>
+          <p:cNvPr id="29" name="Signo de multiplicación 28">
+            <a:extLst>
+              <a:ext uri="{FF2B5EF4-FFF2-40B4-BE49-F238E27FC236}">
+                <a16:creationId xmlns:a16="http://schemas.microsoft.com/office/drawing/2014/main" id="{F10AD5B8-DAC0-4BBE-A8A9-A19D7EE29B19}"/>
+              </a:ext>
+            </a:extLst>
+          </p:cNvPr>
+          <p:cNvSpPr/>
+          <p:nvPr/>
+        </p:nvSpPr>
+        <p:spPr>
+          <a:xfrm>
+            <a:off x="5666274" y="1069795"/>
+            <a:ext cx="81593" cy="75756"/>
+          </a:xfrm>
+          <a:prstGeom prst="mathMultiply">
+            <a:avLst>
+              <a:gd name="adj1" fmla="val 13236"/>
+            </a:avLst>
+          </a:prstGeom>
+          <a:solidFill>
+            <a:srgbClr val="F3F3F3"/>
+          </a:solidFill>
+          <a:ln>
+            <a:noFill/>
+          </a:ln>
+        </p:spPr>
+        <p:style>
+          <a:lnRef idx="2">
+            <a:schemeClr val="accent1">
+              <a:shade val="50000"/>
+            </a:schemeClr>
+          </a:lnRef>
+          <a:fillRef idx="1">
+            <a:schemeClr val="accent1"/>
+          </a:fillRef>
+          <a:effectRef idx="0">
+            <a:schemeClr val="accent1"/>
+          </a:effectRef>
+          <a:fontRef idx="minor">
+            <a:schemeClr val="lt1"/>
+          </a:fontRef>
+        </p:style>
+        <p:txBody>
+          <a:bodyPr rtlCol="0" anchor="ctr"/>
+          <a:lstStyle/>
+          <a:p>
+            <a:pPr algn="ctr"/>
+            <a:endParaRPr lang="es-419"/>
+          </a:p>
+        </p:txBody>
+      </p:sp>
+      <p:sp>
+        <p:nvSpPr>
+          <p:cNvPr id="30" name="Rectángulo 29">
+            <a:extLst>
+              <a:ext uri="{FF2B5EF4-FFF2-40B4-BE49-F238E27FC236}">
+                <a16:creationId xmlns:a16="http://schemas.microsoft.com/office/drawing/2014/main" id="{4F46FF3C-B8FA-4617-882D-812D09BCB314}"/>
+              </a:ext>
+            </a:extLst>
+          </p:cNvPr>
+          <p:cNvSpPr/>
+          <p:nvPr/>
+        </p:nvSpPr>
+        <p:spPr>
+          <a:xfrm>
+            <a:off x="6244031" y="1069795"/>
+            <a:ext cx="4771802" cy="85888"/>
+          </a:xfrm>
+          <a:prstGeom prst="rect">
+            <a:avLst/>
+          </a:prstGeom>
+          <a:solidFill>
+            <a:srgbClr val="217346"/>
+          </a:solidFill>
+          <a:ln>
+            <a:noFill/>
+          </a:ln>
+        </p:spPr>
+        <p:style>
+          <a:lnRef idx="2">
+            <a:schemeClr val="accent1">
+              <a:shade val="50000"/>
+            </a:schemeClr>
+          </a:lnRef>
+          <a:fillRef idx="1">
+            <a:schemeClr val="accent1"/>
+          </a:fillRef>
+          <a:effectRef idx="0">
+            <a:schemeClr val="accent1"/>
+          </a:effectRef>
+          <a:fontRef idx="minor">
+            <a:schemeClr val="lt1"/>
+          </a:fontRef>
+        </p:style>
+        <p:txBody>
+          <a:bodyPr rtlCol="0" anchor="ctr"/>
+          <a:lstStyle/>
+          <a:p>
+            <a:pPr algn="ctr"/>
+            <a:endParaRPr lang="es-419"/>
+          </a:p>
+        </p:txBody>
+      </p:sp>
+      <p:sp>
+        <p:nvSpPr>
+          <p:cNvPr id="31" name="Rectángulo 30">
+            <a:extLst>
+              <a:ext uri="{FF2B5EF4-FFF2-40B4-BE49-F238E27FC236}">
+                <a16:creationId xmlns:a16="http://schemas.microsoft.com/office/drawing/2014/main" id="{995850BB-0290-44B0-8CDF-83EBF5F38ACE}"/>
+              </a:ext>
+            </a:extLst>
+          </p:cNvPr>
+          <p:cNvSpPr/>
+          <p:nvPr/>
+        </p:nvSpPr>
+        <p:spPr>
+          <a:xfrm>
+            <a:off x="6246267" y="1155386"/>
+            <a:ext cx="4769564" cy="190813"/>
+          </a:xfrm>
+          <a:prstGeom prst="rect">
+            <a:avLst/>
+          </a:prstGeom>
+          <a:solidFill>
+            <a:srgbClr val="F3F3F3"/>
+          </a:solidFill>
+          <a:ln>
+            <a:noFill/>
+          </a:ln>
+        </p:spPr>
+        <p:style>
+          <a:lnRef idx="2">
+            <a:schemeClr val="accent1">
+              <a:shade val="50000"/>
+            </a:schemeClr>
+          </a:lnRef>
+          <a:fillRef idx="1">
+            <a:schemeClr val="accent1"/>
+          </a:fillRef>
+          <a:effectRef idx="0">
+            <a:schemeClr val="accent1"/>
+          </a:effectRef>
+          <a:fontRef idx="minor">
+            <a:schemeClr val="lt1"/>
+          </a:fontRef>
+        </p:style>
+        <p:txBody>
+          <a:bodyPr rtlCol="0" anchor="ctr"/>
+          <a:lstStyle/>
+          <a:p>
+            <a:pPr algn="ctr"/>
+            <a:endParaRPr lang="es-419"/>
+          </a:p>
+        </p:txBody>
+      </p:sp>
+      <p:sp>
+        <p:nvSpPr>
+          <p:cNvPr id="32" name="Signo de multiplicación 31">
+            <a:extLst>
+              <a:ext uri="{FF2B5EF4-FFF2-40B4-BE49-F238E27FC236}">
+                <a16:creationId xmlns:a16="http://schemas.microsoft.com/office/drawing/2014/main" id="{F0BDBE99-BC19-4B23-8C5B-5E6505F93362}"/>
+              </a:ext>
+            </a:extLst>
+          </p:cNvPr>
+          <p:cNvSpPr/>
+          <p:nvPr/>
+        </p:nvSpPr>
+        <p:spPr>
+          <a:xfrm>
+            <a:off x="10934237" y="1069795"/>
+            <a:ext cx="81593" cy="75756"/>
+          </a:xfrm>
+          <a:prstGeom prst="mathMultiply">
+            <a:avLst>
+              <a:gd name="adj1" fmla="val 13236"/>
+            </a:avLst>
+          </a:prstGeom>
+          <a:solidFill>
+            <a:srgbClr val="F3F3F3"/>
+          </a:solidFill>
+          <a:ln>
+            <a:noFill/>
+          </a:ln>
+        </p:spPr>
+        <p:style>
+          <a:lnRef idx="2">
+            <a:schemeClr val="accent1">
+              <a:shade val="50000"/>
+            </a:schemeClr>
+          </a:lnRef>
+          <a:fillRef idx="1">
+            <a:schemeClr val="accent1"/>
+          </a:fillRef>
+          <a:effectRef idx="0">
+            <a:schemeClr val="accent1"/>
+          </a:effectRef>
+          <a:fontRef idx="minor">
+            <a:schemeClr val="lt1"/>
+          </a:fontRef>
+        </p:style>
+        <p:txBody>
+          <a:bodyPr rtlCol="0" anchor="ctr"/>
+          <a:lstStyle/>
+          <a:p>
+            <a:pPr algn="ctr"/>
+            <a:endParaRPr lang="es-419"/>
+          </a:p>
+        </p:txBody>
+      </p:sp>
+    </p:spTree>
+    <p:extLst>
+      <p:ext uri="{BB962C8B-B14F-4D97-AF65-F5344CB8AC3E}">
+        <p14:creationId xmlns:p14="http://schemas.microsoft.com/office/powerpoint/2010/main" val="280598131"/>
+      </p:ext>
+    </p:extLst>
+  </p:cSld>
+  <p:clrMapOvr>
+    <a:masterClrMapping/>
+  </p:clrMapOvr>
+</p:sld>
+</file>
+
+<file path=ppt/slides/slide14.xml><?xml version="1.0" encoding="utf-8"?>
+<p:sld xmlns:a="http://schemas.openxmlformats.org/drawingml/2006/main" xmlns:r="http://schemas.openxmlformats.org/officeDocument/2006/relationships" xmlns:p="http://schemas.openxmlformats.org/presentationml/2006/main">
+  <p:cSld>
+    <p:spTree>
+      <p:nvGrpSpPr>
+        <p:cNvPr id="1" name=""/>
+        <p:cNvGrpSpPr/>
+        <p:nvPr/>
+      </p:nvGrpSpPr>
+      <p:grpSpPr>
+        <a:xfrm>
+          <a:off x="0" y="0"/>
+          <a:ext cx="0" cy="0"/>
+          <a:chOff x="0" y="0"/>
+          <a:chExt cx="0" cy="0"/>
+        </a:xfrm>
+      </p:grpSpPr>
       <p:grpSp>
         <p:nvGrpSpPr>
           <p:cNvPr id="6" name="Grupo 5">
@@ -13556,7 +16031,7 @@
 </p:sld>
 </file>
 
-<file path=ppt/slides/slide13.xml><?xml version="1.0" encoding="utf-8"?>
+<file path=ppt/slides/slide15.xml><?xml version="1.0" encoding="utf-8"?>
 <p:sld xmlns:a="http://schemas.openxmlformats.org/drawingml/2006/main" xmlns:r="http://schemas.openxmlformats.org/officeDocument/2006/relationships" xmlns:p="http://schemas.openxmlformats.org/presentationml/2006/main">
   <p:cSld>
     <p:spTree>
@@ -15507,6 +17982,72 @@
     <p:extLst>
       <p:ext uri="{BB962C8B-B14F-4D97-AF65-F5344CB8AC3E}">
         <p14:creationId xmlns:p14="http://schemas.microsoft.com/office/powerpoint/2010/main" val="565750693"/>
+      </p:ext>
+    </p:extLst>
+  </p:cSld>
+  <p:clrMapOvr>
+    <a:masterClrMapping/>
+  </p:clrMapOvr>
+</p:sld>
+</file>
+
+<file path=ppt/slides/slide16.xml><?xml version="1.0" encoding="utf-8"?>
+<p:sld xmlns:a="http://schemas.openxmlformats.org/drawingml/2006/main" xmlns:r="http://schemas.openxmlformats.org/officeDocument/2006/relationships" xmlns:p="http://schemas.openxmlformats.org/presentationml/2006/main">
+  <p:cSld>
+    <p:spTree>
+      <p:nvGrpSpPr>
+        <p:cNvPr id="1" name=""/>
+        <p:cNvGrpSpPr/>
+        <p:nvPr/>
+      </p:nvGrpSpPr>
+      <p:grpSpPr>
+        <a:xfrm>
+          <a:off x="0" y="0"/>
+          <a:ext cx="0" cy="0"/>
+          <a:chOff x="0" y="0"/>
+          <a:chExt cx="0" cy="0"/>
+        </a:xfrm>
+      </p:grpSpPr>
+      <p:pic>
+        <p:nvPicPr>
+          <p:cNvPr id="5" name="Imagen 4">
+            <a:extLst>
+              <a:ext uri="{FF2B5EF4-FFF2-40B4-BE49-F238E27FC236}">
+                <a16:creationId xmlns:a16="http://schemas.microsoft.com/office/drawing/2014/main" id="{32F22644-81F6-4721-9AE4-51158DE44E64}"/>
+              </a:ext>
+            </a:extLst>
+          </p:cNvPr>
+          <p:cNvPicPr>
+            <a:picLocks noChangeAspect="1"/>
+          </p:cNvPicPr>
+          <p:nvPr/>
+        </p:nvPicPr>
+        <p:blipFill>
+          <a:blip r:embed="rId2">
+            <a:extLst>
+              <a:ext uri="{28A0092B-C50C-407E-A947-70E740481C1C}">
+                <a14:useLocalDpi xmlns:a14="http://schemas.microsoft.com/office/drawing/2010/main" val="0"/>
+              </a:ext>
+            </a:extLst>
+          </a:blip>
+          <a:stretch>
+            <a:fillRect/>
+          </a:stretch>
+        </p:blipFill>
+        <p:spPr>
+          <a:xfrm>
+            <a:off x="609123" y="728238"/>
+            <a:ext cx="10769926" cy="5401524"/>
+          </a:xfrm>
+          <a:prstGeom prst="rect">
+            <a:avLst/>
+          </a:prstGeom>
+        </p:spPr>
+      </p:pic>
+    </p:spTree>
+    <p:extLst>
+      <p:ext uri="{BB962C8B-B14F-4D97-AF65-F5344CB8AC3E}">
+        <p14:creationId xmlns:p14="http://schemas.microsoft.com/office/powerpoint/2010/main" val="1467913520"/>
       </p:ext>
     </p:extLst>
   </p:cSld>

</xml_diff>